<commit_message>
Update - Addressing Ibrahim's Comments
(thanks for input Kerstin, Suet, and James)
</commit_message>
<xml_diff>
--- a/source/figures/Figs_Artwork_2023-02-09.pptx
+++ b/source/figures/Figs_Artwork_2023-02-09.pptx
@@ -21415,10 +21415,10 @@
       </p:grpSpPr>
       <p:sp>
         <p:nvSpPr>
-          <p:cNvPr id="4" name="Folded Corner 10">
-            <a:extLst>
-              <a:ext uri="{FF2B5EF4-FFF2-40B4-BE49-F238E27FC236}">
-                <a16:creationId xmlns:a16="http://schemas.microsoft.com/office/drawing/2014/main" id="{10821AAB-99EC-DCF4-8289-28FD9B3061E7}"/>
+          <p:cNvPr id="20" name="Pentagon 19">
+            <a:extLst>
+              <a:ext uri="{FF2B5EF4-FFF2-40B4-BE49-F238E27FC236}">
+                <a16:creationId xmlns:a16="http://schemas.microsoft.com/office/drawing/2014/main" id="{7139832F-3762-FD86-F5A0-D408F4FBA22B}"/>
               </a:ext>
             </a:extLst>
           </p:cNvPr>
@@ -21426,9 +21426,127 @@
           <p:nvPr/>
         </p:nvSpPr>
         <p:spPr>
+          <a:xfrm>
+            <a:off x="1519728" y="1455357"/>
+            <a:ext cx="6271404" cy="163129"/>
+          </a:xfrm>
+          <a:prstGeom prst="homePlate">
+            <a:avLst/>
+          </a:prstGeom>
+          <a:noFill/>
+          <a:ln>
+            <a:solidFill>
+              <a:schemeClr val="tx1"/>
+            </a:solidFill>
+          </a:ln>
+        </p:spPr>
+        <p:style>
+          <a:lnRef idx="2">
+            <a:schemeClr val="accent1">
+              <a:shade val="50000"/>
+            </a:schemeClr>
+          </a:lnRef>
+          <a:fillRef idx="1">
+            <a:schemeClr val="accent1"/>
+          </a:fillRef>
+          <a:effectRef idx="0">
+            <a:schemeClr val="accent1"/>
+          </a:effectRef>
+          <a:fontRef idx="minor">
+            <a:schemeClr val="lt1"/>
+          </a:fontRef>
+        </p:style>
+        <p:txBody>
+          <a:bodyPr rtlCol="0" anchor="ctr"/>
+          <a:lstStyle/>
+          <a:p>
+            <a:pPr algn="ctr"/>
+            <a:r>
+              <a:rPr lang="en-GB" sz="1500" dirty="0">
+                <a:solidFill>
+                  <a:schemeClr val="tx1"/>
+                </a:solidFill>
+              </a:rPr>
+              <a:t>EB Development for Swarm</a:t>
+            </a:r>
+          </a:p>
+        </p:txBody>
+      </p:sp>
+      <p:sp>
+        <p:nvSpPr>
+          <p:cNvPr id="21" name="Pentagon 20">
+            <a:extLst>
+              <a:ext uri="{FF2B5EF4-FFF2-40B4-BE49-F238E27FC236}">
+                <a16:creationId xmlns:a16="http://schemas.microsoft.com/office/drawing/2014/main" id="{7926F862-D217-D18B-7952-3862F37E35AC}"/>
+              </a:ext>
+            </a:extLst>
+          </p:cNvPr>
+          <p:cNvSpPr/>
+          <p:nvPr/>
+        </p:nvSpPr>
+        <p:spPr>
+          <a:xfrm rot="10800000" flipV="1">
+            <a:off x="1519728" y="2658713"/>
+            <a:ext cx="6271404" cy="171819"/>
+          </a:xfrm>
+          <a:prstGeom prst="homePlate">
+            <a:avLst/>
+          </a:prstGeom>
+          <a:noFill/>
+          <a:ln>
+            <a:solidFill>
+              <a:schemeClr val="tx1"/>
+            </a:solidFill>
+          </a:ln>
+        </p:spPr>
+        <p:style>
+          <a:lnRef idx="2">
+            <a:schemeClr val="accent1">
+              <a:shade val="50000"/>
+            </a:schemeClr>
+          </a:lnRef>
+          <a:fillRef idx="1">
+            <a:schemeClr val="accent1"/>
+          </a:fillRef>
+          <a:effectRef idx="0">
+            <a:schemeClr val="accent1"/>
+          </a:effectRef>
+          <a:fontRef idx="minor">
+            <a:schemeClr val="lt1"/>
+          </a:fontRef>
+        </p:style>
+        <p:txBody>
+          <a:bodyPr rtlCol="0" anchor="ctr"/>
+          <a:lstStyle/>
+          <a:p>
+            <a:pPr algn="ctr"/>
+            <a:r>
+              <a:rPr lang="en-GB" sz="1500" dirty="0">
+                <a:solidFill>
+                  <a:schemeClr val="tx1"/>
+                </a:solidFill>
+              </a:rPr>
+              <a:t>Feedback and Iterate</a:t>
+            </a:r>
+          </a:p>
+        </p:txBody>
+      </p:sp>
+      <p:sp>
+        <p:nvSpPr>
+          <p:cNvPr id="22" name="Folded Corner 10">
+            <a:extLst>
+              <a:ext uri="{FF2B5EF4-FFF2-40B4-BE49-F238E27FC236}">
+                <a16:creationId xmlns:a16="http://schemas.microsoft.com/office/drawing/2014/main" id="{146B4507-45FD-C9D3-F922-B7D4BA230CA9}"/>
+              </a:ext>
+            </a:extLst>
+          </p:cNvPr>
+          <p:cNvSpPr/>
+          <p:nvPr/>
+        </p:nvSpPr>
+        <p:spPr>
           <a:xfrm rot="16200000">
-            <a:off x="11391777" y="670332"/>
-            <a:ext cx="668060" cy="1364457"/>
+            <a:off x="659477" y="1673340"/>
+            <a:ext cx="477200" cy="949904"/>
           </a:xfrm>
           <a:prstGeom prst="foldedCorner">
             <a:avLst>
@@ -21468,7 +21586,7 @@
           <a:lstStyle/>
           <a:p>
             <a:pPr algn="ctr"/>
-            <a:endParaRPr lang="en-GB" sz="1050">
+            <a:endParaRPr lang="en-GB" sz="1000" dirty="0">
               <a:solidFill>
                 <a:schemeClr val="tx1"/>
               </a:solidFill>
@@ -21478,10 +21596,10 @@
       </p:sp>
       <p:sp>
         <p:nvSpPr>
-          <p:cNvPr id="5" name="TextBox 4">
-            <a:extLst>
-              <a:ext uri="{FF2B5EF4-FFF2-40B4-BE49-F238E27FC236}">
-                <a16:creationId xmlns:a16="http://schemas.microsoft.com/office/drawing/2014/main" id="{1597FDC9-6A43-758D-1292-6F08998116A7}"/>
+          <p:cNvPr id="23" name="TextBox 22">
+            <a:extLst>
+              <a:ext uri="{FF2B5EF4-FFF2-40B4-BE49-F238E27FC236}">
+                <a16:creationId xmlns:a16="http://schemas.microsoft.com/office/drawing/2014/main" id="{B89C7E3E-BC41-4A58-E0E9-00BD1B61B295}"/>
               </a:ext>
             </a:extLst>
           </p:cNvPr>
@@ -21490,8 +21608,58 @@
         </p:nvSpPr>
         <p:spPr>
           <a:xfrm>
-            <a:off x="10948947" y="1143956"/>
-            <a:ext cx="1502456" cy="484620"/>
+            <a:off x="327021" y="1919713"/>
+            <a:ext cx="1141377" cy="467179"/>
+          </a:xfrm>
+          <a:prstGeom prst="rect">
+            <a:avLst/>
+          </a:prstGeom>
+          <a:noFill/>
+        </p:spPr>
+        <p:txBody>
+          <a:bodyPr wrap="square" lIns="0" tIns="0" rIns="0" bIns="0" rtlCol="0" anchor="t">
+            <a:spAutoFit/>
+          </a:bodyPr>
+          <a:lstStyle/>
+          <a:p>
+            <a:pPr algn="ctr">
+              <a:lnSpc>
+                <a:spcPts val="1200"/>
+              </a:lnSpc>
+            </a:pPr>
+            <a:r>
+              <a:rPr lang="en-GB" sz="1300" dirty="0"/>
+              <a:t>System</a:t>
+            </a:r>
+            <a:br>
+              <a:rPr lang="en-GB" sz="1300" dirty="0"/>
+            </a:br>
+            <a:r>
+              <a:rPr lang="en-GB" sz="1300" dirty="0"/>
+              <a:t>Safety Requirements</a:t>
+            </a:r>
+            <a:endParaRPr lang="en-GB" sz="1300" dirty="0">
+              <a:cs typeface="Arial"/>
+            </a:endParaRPr>
+          </a:p>
+        </p:txBody>
+      </p:sp>
+      <p:sp>
+        <p:nvSpPr>
+          <p:cNvPr id="25" name="TextBox 24">
+            <a:extLst>
+              <a:ext uri="{FF2B5EF4-FFF2-40B4-BE49-F238E27FC236}">
+                <a16:creationId xmlns:a16="http://schemas.microsoft.com/office/drawing/2014/main" id="{B8C47711-8D23-945B-BC1B-DFF01D990A6C}"/>
+              </a:ext>
+            </a:extLst>
+          </p:cNvPr>
+          <p:cNvSpPr txBox="1"/>
+          <p:nvPr/>
+        </p:nvSpPr>
+        <p:spPr>
+          <a:xfrm>
+            <a:off x="7914355" y="1956585"/>
+            <a:ext cx="1081596" cy="436402"/>
           </a:xfrm>
           <a:prstGeom prst="rect">
             <a:avLst/>
@@ -21506,14 +21674,14 @@
           <a:p>
             <a:pPr algn="ctr">
               <a:lnSpc>
-                <a:spcPts val="1400"/>
+                <a:spcPts val="1200"/>
               </a:lnSpc>
             </a:pPr>
             <a:r>
-              <a:rPr lang="en-GB" sz="1400" dirty="0"/>
-              <a:t>[A] System Safety Requirements</a:t>
-            </a:r>
-            <a:endParaRPr lang="en-GB" sz="1400" dirty="0">
+              <a:rPr lang="en-GB" sz="1300" dirty="0"/>
+              <a:t>Safety Case for Swarm </a:t>
+            </a:r>
+            <a:endParaRPr lang="en-GB" sz="1300" dirty="0">
               <a:cs typeface="Arial"/>
             </a:endParaRPr>
           </a:p>
@@ -21521,10 +21689,10 @@
       </p:sp>
       <p:sp>
         <p:nvSpPr>
-          <p:cNvPr id="6" name="Folded Corner 12">
-            <a:extLst>
-              <a:ext uri="{FF2B5EF4-FFF2-40B4-BE49-F238E27FC236}">
-                <a16:creationId xmlns:a16="http://schemas.microsoft.com/office/drawing/2014/main" id="{65A6659E-1C43-7674-FF16-CD8D034C5D2C}"/>
+          <p:cNvPr id="26" name="Rectangle 25">
+            <a:extLst>
+              <a:ext uri="{FF2B5EF4-FFF2-40B4-BE49-F238E27FC236}">
+                <a16:creationId xmlns:a16="http://schemas.microsoft.com/office/drawing/2014/main" id="{99C0E08C-F17F-CC82-E0BA-47A6439B919D}"/>
               </a:ext>
             </a:extLst>
           </p:cNvPr>
@@ -21532,16 +21700,18 @@
           <p:nvPr/>
         </p:nvSpPr>
         <p:spPr>
-          <a:xfrm rot="16200000">
-            <a:off x="12960674" y="670332"/>
-            <a:ext cx="668060" cy="1364457"/>
-          </a:xfrm>
-          <a:prstGeom prst="foldedCorner">
-            <a:avLst>
-              <a:gd name="adj" fmla="val 40193"/>
-            </a:avLst>
-          </a:prstGeom>
-          <a:noFill/>
+          <a:xfrm>
+            <a:off x="1521665" y="1899760"/>
+            <a:ext cx="925198" cy="487131"/>
+          </a:xfrm>
+          <a:prstGeom prst="rect">
+            <a:avLst/>
+          </a:prstGeom>
+          <a:solidFill>
+            <a:schemeClr val="bg2">
+              <a:lumMod val="90000"/>
+            </a:schemeClr>
+          </a:solidFill>
           <a:ln w="19050">
             <a:solidFill>
               <a:schemeClr val="tx1"/>
@@ -21574,20 +21744,16 @@
           <a:lstStyle/>
           <a:p>
             <a:pPr algn="ctr"/>
-            <a:endParaRPr lang="en-GB" sz="1050">
-              <a:solidFill>
-                <a:schemeClr val="tx1"/>
-              </a:solidFill>
-            </a:endParaRPr>
+            <a:endParaRPr lang="en-GB" sz="1000"/>
           </a:p>
         </p:txBody>
       </p:sp>
       <p:sp>
         <p:nvSpPr>
-          <p:cNvPr id="7" name="TextBox 6">
-            <a:extLst>
-              <a:ext uri="{FF2B5EF4-FFF2-40B4-BE49-F238E27FC236}">
-                <a16:creationId xmlns:a16="http://schemas.microsoft.com/office/drawing/2014/main" id="{8E23A931-07F5-793F-A664-EAA1027D94DC}"/>
+          <p:cNvPr id="27" name="TextBox 26">
+            <a:extLst>
+              <a:ext uri="{FF2B5EF4-FFF2-40B4-BE49-F238E27FC236}">
+                <a16:creationId xmlns:a16="http://schemas.microsoft.com/office/drawing/2014/main" id="{0E265C16-09EF-7DD6-2482-15202AF1B819}"/>
               </a:ext>
             </a:extLst>
           </p:cNvPr>
@@ -21596,8 +21762,8 @@
         </p:nvSpPr>
         <p:spPr>
           <a:xfrm>
-            <a:off x="12594128" y="1147623"/>
-            <a:ext cx="1364456" cy="453842"/>
+            <a:off x="1532820" y="1872363"/>
+            <a:ext cx="979597" cy="559512"/>
           </a:xfrm>
           <a:prstGeom prst="rect">
             <a:avLst/>
@@ -21612,22 +21778,61 @@
           <a:p>
             <a:pPr algn="ctr">
               <a:lnSpc>
-                <a:spcPts val="1400"/>
+                <a:spcPts val="1200"/>
               </a:lnSpc>
             </a:pPr>
             <a:r>
-              <a:rPr lang="en-GB" sz="1400" dirty="0"/>
-              <a:t>[C] System Description</a:t>
+              <a:rPr lang="en-GB" sz="1300" dirty="0"/>
+              <a:t>1. EB Safety Assurance Scoping</a:t>
             </a:r>
           </a:p>
         </p:txBody>
       </p:sp>
       <p:sp>
         <p:nvSpPr>
-          <p:cNvPr id="8" name="Folded Corner 14">
-            <a:extLst>
-              <a:ext uri="{FF2B5EF4-FFF2-40B4-BE49-F238E27FC236}">
-                <a16:creationId xmlns:a16="http://schemas.microsoft.com/office/drawing/2014/main" id="{4FB113C6-1345-ED58-1900-D7BD30C9834F}"/>
+          <p:cNvPr id="30" name="TextBox 29">
+            <a:extLst>
+              <a:ext uri="{FF2B5EF4-FFF2-40B4-BE49-F238E27FC236}">
+                <a16:creationId xmlns:a16="http://schemas.microsoft.com/office/drawing/2014/main" id="{3D0AE7D1-4CF3-3E18-CC42-9EE4EF8BFEB9}"/>
+              </a:ext>
+            </a:extLst>
+          </p:cNvPr>
+          <p:cNvSpPr txBox="1"/>
+          <p:nvPr/>
+        </p:nvSpPr>
+        <p:spPr>
+          <a:xfrm>
+            <a:off x="2390573" y="4508520"/>
+            <a:ext cx="6357668" cy="923330"/>
+          </a:xfrm>
+          <a:prstGeom prst="rect">
+            <a:avLst/>
+          </a:prstGeom>
+          <a:noFill/>
+        </p:spPr>
+        <p:txBody>
+          <a:bodyPr wrap="square">
+            <a:spAutoFit/>
+          </a:bodyPr>
+          <a:lstStyle/>
+          <a:p>
+            <a:r>
+              <a:rPr lang="en-GB" dirty="0" err="1"/>
+              <a:t>AERoS</a:t>
+            </a:r>
+            <a:r>
+              <a:rPr lang="en-GB" dirty="0"/>
+              <a:t> is iterative by design, and contains six stages where assurance activities are performed in parallel to the development activities. </a:t>
+            </a:r>
+          </a:p>
+        </p:txBody>
+      </p:sp>
+      <p:sp>
+        <p:nvSpPr>
+          <p:cNvPr id="42" name="Rectangle 41">
+            <a:extLst>
+              <a:ext uri="{FF2B5EF4-FFF2-40B4-BE49-F238E27FC236}">
+                <a16:creationId xmlns:a16="http://schemas.microsoft.com/office/drawing/2014/main" id="{8365D02E-AD75-C1F0-153E-78D39C0CD254}"/>
               </a:ext>
             </a:extLst>
           </p:cNvPr>
@@ -21635,16 +21840,18 @@
           <p:nvPr/>
         </p:nvSpPr>
         <p:spPr>
-          <a:xfrm rot="16200000">
-            <a:off x="11391778" y="1589677"/>
-            <a:ext cx="668060" cy="1364457"/>
-          </a:xfrm>
-          <a:prstGeom prst="foldedCorner">
-            <a:avLst>
-              <a:gd name="adj" fmla="val 40193"/>
-            </a:avLst>
-          </a:prstGeom>
-          <a:noFill/>
+          <a:xfrm>
+            <a:off x="2606577" y="1894538"/>
+            <a:ext cx="947886" cy="487131"/>
+          </a:xfrm>
+          <a:prstGeom prst="rect">
+            <a:avLst/>
+          </a:prstGeom>
+          <a:solidFill>
+            <a:schemeClr val="bg2">
+              <a:lumMod val="90000"/>
+            </a:schemeClr>
+          </a:solidFill>
           <a:ln w="19050">
             <a:solidFill>
               <a:schemeClr val="tx1"/>
@@ -21677,20 +21884,16 @@
           <a:lstStyle/>
           <a:p>
             <a:pPr algn="ctr"/>
-            <a:endParaRPr lang="en-GB" sz="1050">
-              <a:solidFill>
-                <a:schemeClr val="tx1"/>
-              </a:solidFill>
-            </a:endParaRPr>
+            <a:endParaRPr lang="en-GB" sz="1000"/>
           </a:p>
         </p:txBody>
       </p:sp>
       <p:sp>
         <p:nvSpPr>
-          <p:cNvPr id="9" name="TextBox 8">
-            <a:extLst>
-              <a:ext uri="{FF2B5EF4-FFF2-40B4-BE49-F238E27FC236}">
-                <a16:creationId xmlns:a16="http://schemas.microsoft.com/office/drawing/2014/main" id="{5DCA21CB-E786-8124-47C4-4BB17429FF48}"/>
+          <p:cNvPr id="43" name="TextBox 42">
+            <a:extLst>
+              <a:ext uri="{FF2B5EF4-FFF2-40B4-BE49-F238E27FC236}">
+                <a16:creationId xmlns:a16="http://schemas.microsoft.com/office/drawing/2014/main" id="{63C851F2-A598-E070-4AFF-A62C26A7CAB0}"/>
               </a:ext>
             </a:extLst>
           </p:cNvPr>
@@ -21699,8 +21902,8 @@
         </p:nvSpPr>
         <p:spPr>
           <a:xfrm>
-            <a:off x="11002233" y="2111278"/>
-            <a:ext cx="1364456" cy="453842"/>
+            <a:off x="2608844" y="1920070"/>
+            <a:ext cx="944580" cy="467179"/>
           </a:xfrm>
           <a:prstGeom prst="rect">
             <a:avLst/>
@@ -21708,29 +21911,29 @@
           <a:noFill/>
         </p:spPr>
         <p:txBody>
-          <a:bodyPr wrap="square" rtlCol="0">
+          <a:bodyPr wrap="square" lIns="0" tIns="0" rIns="0" bIns="0" rtlCol="0">
             <a:spAutoFit/>
           </a:bodyPr>
           <a:lstStyle/>
           <a:p>
             <a:pPr algn="ctr">
               <a:lnSpc>
-                <a:spcPts val="1400"/>
+                <a:spcPts val="1200"/>
               </a:lnSpc>
             </a:pPr>
             <a:r>
-              <a:rPr lang="en-GB" sz="1400" dirty="0"/>
-              <a:t>[B] Environment Description</a:t>
+              <a:rPr lang="en-GB" sz="1300" dirty="0"/>
+              <a:t>2. EB Safety Requirements Assurance</a:t>
             </a:r>
           </a:p>
         </p:txBody>
       </p:sp>
       <p:sp>
         <p:nvSpPr>
-          <p:cNvPr id="10" name="Rectangle 9">
-            <a:extLst>
-              <a:ext uri="{FF2B5EF4-FFF2-40B4-BE49-F238E27FC236}">
-                <a16:creationId xmlns:a16="http://schemas.microsoft.com/office/drawing/2014/main" id="{4AF8374B-A835-0338-DC33-81AFF1FE0124}"/>
+          <p:cNvPr id="44" name="Rectangle 43">
+            <a:extLst>
+              <a:ext uri="{FF2B5EF4-FFF2-40B4-BE49-F238E27FC236}">
+                <a16:creationId xmlns:a16="http://schemas.microsoft.com/office/drawing/2014/main" id="{8017490D-35E8-8F6C-1328-B376B343D3A0}"/>
               </a:ext>
             </a:extLst>
           </p:cNvPr>
@@ -21739,8 +21942,8 @@
         </p:nvSpPr>
         <p:spPr>
           <a:xfrm>
-            <a:off x="11866465" y="2963123"/>
-            <a:ext cx="1751668" cy="735807"/>
+            <a:off x="3694774" y="1894538"/>
+            <a:ext cx="925198" cy="487126"/>
           </a:xfrm>
           <a:prstGeom prst="rect">
             <a:avLst/>
@@ -21782,26 +21985,26 @@
           <a:lstStyle/>
           <a:p>
             <a:pPr algn="ctr"/>
-            <a:endParaRPr lang="en-GB" sz="1050"/>
+            <a:endParaRPr lang="en-GB" sz="1000"/>
           </a:p>
         </p:txBody>
       </p:sp>
       <p:sp>
         <p:nvSpPr>
-          <p:cNvPr id="11" name="TextBox 10">
-            <a:extLst>
-              <a:ext uri="{FF2B5EF4-FFF2-40B4-BE49-F238E27FC236}">
-                <a16:creationId xmlns:a16="http://schemas.microsoft.com/office/drawing/2014/main" id="{5E779410-26E5-1D42-5D0F-443F5591375F}"/>
-              </a:ext>
-            </a:extLst>
-          </p:cNvPr>
-          <p:cNvSpPr txBox="1"/>
+          <p:cNvPr id="46" name="Rectangle 45">
+            <a:extLst>
+              <a:ext uri="{FF2B5EF4-FFF2-40B4-BE49-F238E27FC236}">
+                <a16:creationId xmlns:a16="http://schemas.microsoft.com/office/drawing/2014/main" id="{3FFE0581-B36F-AADE-156E-B81C02467D2D}"/>
+              </a:ext>
+            </a:extLst>
+          </p:cNvPr>
+          <p:cNvSpPr/>
           <p:nvPr/>
         </p:nvSpPr>
         <p:spPr>
           <a:xfrm>
-            <a:off x="11898519" y="2982271"/>
-            <a:ext cx="1673708" cy="710003"/>
+            <a:off x="4779686" y="1889316"/>
+            <a:ext cx="925198" cy="497574"/>
           </a:xfrm>
           <a:prstGeom prst="rect">
             <a:avLst/>
@@ -21811,523 +22014,6 @@
               <a:lumMod val="90000"/>
             </a:schemeClr>
           </a:solidFill>
-        </p:spPr>
-        <p:txBody>
-          <a:bodyPr wrap="square" rtlCol="0">
-            <a:spAutoFit/>
-          </a:bodyPr>
-          <a:lstStyle/>
-          <a:p>
-            <a:pPr algn="ctr">
-              <a:lnSpc>
-                <a:spcPts val="1200"/>
-              </a:lnSpc>
-            </a:pPr>
-            <a:r>
-              <a:rPr lang="en-GB" sz="1400" dirty="0"/>
-              <a:t>1. Define the Assurance Scope for the EB Description &amp; Expected Output</a:t>
-            </a:r>
-          </a:p>
-        </p:txBody>
-      </p:sp>
-      <p:cxnSp>
-        <p:nvCxnSpPr>
-          <p:cNvPr id="12" name="Straight Connector 11">
-            <a:extLst>
-              <a:ext uri="{FF2B5EF4-FFF2-40B4-BE49-F238E27FC236}">
-                <a16:creationId xmlns:a16="http://schemas.microsoft.com/office/drawing/2014/main" id="{F58236F8-E00C-3F2A-E01D-5AB82010A15B}"/>
-              </a:ext>
-            </a:extLst>
-          </p:cNvPr>
-          <p:cNvCxnSpPr>
-            <a:cxnSpLocks/>
-          </p:cNvCxnSpPr>
-          <p:nvPr/>
-        </p:nvCxnSpPr>
-        <p:spPr>
-          <a:xfrm>
-            <a:off x="11697231" y="1679389"/>
-            <a:ext cx="0" cy="121684"/>
-          </a:xfrm>
-          <a:prstGeom prst="line">
-            <a:avLst/>
-          </a:prstGeom>
-          <a:ln w="19050">
-            <a:solidFill>
-              <a:schemeClr val="tx1"/>
-            </a:solidFill>
-            <a:prstDash val="sysDash"/>
-          </a:ln>
-        </p:spPr>
-        <p:style>
-          <a:lnRef idx="1">
-            <a:schemeClr val="accent1"/>
-          </a:lnRef>
-          <a:fillRef idx="0">
-            <a:schemeClr val="accent1"/>
-          </a:fillRef>
-          <a:effectRef idx="0">
-            <a:schemeClr val="accent1"/>
-          </a:effectRef>
-          <a:fontRef idx="minor">
-            <a:schemeClr val="tx1"/>
-          </a:fontRef>
-        </p:style>
-      </p:cxnSp>
-      <p:cxnSp>
-        <p:nvCxnSpPr>
-          <p:cNvPr id="13" name="Straight Connector 12">
-            <a:extLst>
-              <a:ext uri="{FF2B5EF4-FFF2-40B4-BE49-F238E27FC236}">
-                <a16:creationId xmlns:a16="http://schemas.microsoft.com/office/drawing/2014/main" id="{CA4E5E33-D77A-E8D0-F62B-54FEB2256760}"/>
-              </a:ext>
-            </a:extLst>
-          </p:cNvPr>
-          <p:cNvCxnSpPr>
-            <a:cxnSpLocks/>
-          </p:cNvCxnSpPr>
-          <p:nvPr/>
-        </p:nvCxnSpPr>
-        <p:spPr>
-          <a:xfrm>
-            <a:off x="13240666" y="1698383"/>
-            <a:ext cx="0" cy="118600"/>
-          </a:xfrm>
-          <a:prstGeom prst="line">
-            <a:avLst/>
-          </a:prstGeom>
-          <a:ln w="19050">
-            <a:solidFill>
-              <a:schemeClr val="tx1"/>
-            </a:solidFill>
-            <a:prstDash val="sysDash"/>
-          </a:ln>
-        </p:spPr>
-        <p:style>
-          <a:lnRef idx="1">
-            <a:schemeClr val="accent1"/>
-          </a:lnRef>
-          <a:fillRef idx="0">
-            <a:schemeClr val="accent1"/>
-          </a:fillRef>
-          <a:effectRef idx="0">
-            <a:schemeClr val="accent1"/>
-          </a:effectRef>
-          <a:fontRef idx="minor">
-            <a:schemeClr val="tx1"/>
-          </a:fontRef>
-        </p:style>
-      </p:cxnSp>
-      <p:cxnSp>
-        <p:nvCxnSpPr>
-          <p:cNvPr id="14" name="Straight Connector 13">
-            <a:extLst>
-              <a:ext uri="{FF2B5EF4-FFF2-40B4-BE49-F238E27FC236}">
-                <a16:creationId xmlns:a16="http://schemas.microsoft.com/office/drawing/2014/main" id="{A75D4F8D-2952-D8CB-65BF-2CCBB385A185}"/>
-              </a:ext>
-            </a:extLst>
-          </p:cNvPr>
-          <p:cNvCxnSpPr>
-            <a:cxnSpLocks/>
-          </p:cNvCxnSpPr>
-          <p:nvPr/>
-        </p:nvCxnSpPr>
-        <p:spPr>
-          <a:xfrm>
-            <a:off x="11697231" y="1801072"/>
-            <a:ext cx="1538288" cy="0"/>
-          </a:xfrm>
-          <a:prstGeom prst="line">
-            <a:avLst/>
-          </a:prstGeom>
-          <a:ln w="19050">
-            <a:solidFill>
-              <a:schemeClr val="tx1"/>
-            </a:solidFill>
-            <a:prstDash val="sysDash"/>
-          </a:ln>
-        </p:spPr>
-        <p:style>
-          <a:lnRef idx="1">
-            <a:schemeClr val="accent1"/>
-          </a:lnRef>
-          <a:fillRef idx="0">
-            <a:schemeClr val="accent1"/>
-          </a:fillRef>
-          <a:effectRef idx="0">
-            <a:schemeClr val="accent1"/>
-          </a:effectRef>
-          <a:fontRef idx="minor">
-            <a:schemeClr val="tx1"/>
-          </a:fontRef>
-        </p:style>
-      </p:cxnSp>
-      <p:cxnSp>
-        <p:nvCxnSpPr>
-          <p:cNvPr id="15" name="Straight Connector 14">
-            <a:extLst>
-              <a:ext uri="{FF2B5EF4-FFF2-40B4-BE49-F238E27FC236}">
-                <a16:creationId xmlns:a16="http://schemas.microsoft.com/office/drawing/2014/main" id="{CDAA45B7-5995-F131-2ABA-C6C663229F5E}"/>
-              </a:ext>
-            </a:extLst>
-          </p:cNvPr>
-          <p:cNvCxnSpPr>
-            <a:cxnSpLocks/>
-          </p:cNvCxnSpPr>
-          <p:nvPr/>
-        </p:nvCxnSpPr>
-        <p:spPr>
-          <a:xfrm>
-            <a:off x="11697231" y="2613006"/>
-            <a:ext cx="0" cy="121684"/>
-          </a:xfrm>
-          <a:prstGeom prst="line">
-            <a:avLst/>
-          </a:prstGeom>
-          <a:ln w="19050">
-            <a:solidFill>
-              <a:schemeClr val="tx1"/>
-            </a:solidFill>
-            <a:prstDash val="sysDash"/>
-          </a:ln>
-        </p:spPr>
-        <p:style>
-          <a:lnRef idx="1">
-            <a:schemeClr val="accent1"/>
-          </a:lnRef>
-          <a:fillRef idx="0">
-            <a:schemeClr val="accent1"/>
-          </a:fillRef>
-          <a:effectRef idx="0">
-            <a:schemeClr val="accent1"/>
-          </a:effectRef>
-          <a:fontRef idx="minor">
-            <a:schemeClr val="tx1"/>
-          </a:fontRef>
-        </p:style>
-      </p:cxnSp>
-      <p:cxnSp>
-        <p:nvCxnSpPr>
-          <p:cNvPr id="16" name="Straight Connector 15">
-            <a:extLst>
-              <a:ext uri="{FF2B5EF4-FFF2-40B4-BE49-F238E27FC236}">
-                <a16:creationId xmlns:a16="http://schemas.microsoft.com/office/drawing/2014/main" id="{5E9B2FEE-4CCC-6A68-52D3-4485C4C005C5}"/>
-              </a:ext>
-            </a:extLst>
-          </p:cNvPr>
-          <p:cNvCxnSpPr>
-            <a:cxnSpLocks/>
-          </p:cNvCxnSpPr>
-          <p:nvPr/>
-        </p:nvCxnSpPr>
-        <p:spPr>
-          <a:xfrm>
-            <a:off x="13240963" y="2616090"/>
-            <a:ext cx="0" cy="118600"/>
-          </a:xfrm>
-          <a:prstGeom prst="line">
-            <a:avLst/>
-          </a:prstGeom>
-          <a:ln w="19050">
-            <a:solidFill>
-              <a:schemeClr val="tx1"/>
-            </a:solidFill>
-            <a:prstDash val="sysDash"/>
-          </a:ln>
-        </p:spPr>
-        <p:style>
-          <a:lnRef idx="1">
-            <a:schemeClr val="accent1"/>
-          </a:lnRef>
-          <a:fillRef idx="0">
-            <a:schemeClr val="accent1"/>
-          </a:fillRef>
-          <a:effectRef idx="0">
-            <a:schemeClr val="accent1"/>
-          </a:effectRef>
-          <a:fontRef idx="minor">
-            <a:schemeClr val="tx1"/>
-          </a:fontRef>
-        </p:style>
-      </p:cxnSp>
-      <p:cxnSp>
-        <p:nvCxnSpPr>
-          <p:cNvPr id="17" name="Straight Connector 16">
-            <a:extLst>
-              <a:ext uri="{FF2B5EF4-FFF2-40B4-BE49-F238E27FC236}">
-                <a16:creationId xmlns:a16="http://schemas.microsoft.com/office/drawing/2014/main" id="{10FDA6C4-4670-52A7-5548-8BBB7950BCCC}"/>
-              </a:ext>
-            </a:extLst>
-          </p:cNvPr>
-          <p:cNvCxnSpPr>
-            <a:cxnSpLocks/>
-          </p:cNvCxnSpPr>
-          <p:nvPr/>
-        </p:nvCxnSpPr>
-        <p:spPr>
-          <a:xfrm>
-            <a:off x="11697231" y="2726453"/>
-            <a:ext cx="1538288" cy="0"/>
-          </a:xfrm>
-          <a:prstGeom prst="line">
-            <a:avLst/>
-          </a:prstGeom>
-          <a:ln w="19050">
-            <a:solidFill>
-              <a:schemeClr val="tx1"/>
-            </a:solidFill>
-            <a:prstDash val="sysDash"/>
-          </a:ln>
-        </p:spPr>
-        <p:style>
-          <a:lnRef idx="1">
-            <a:schemeClr val="accent1"/>
-          </a:lnRef>
-          <a:fillRef idx="0">
-            <a:schemeClr val="accent1"/>
-          </a:fillRef>
-          <a:effectRef idx="0">
-            <a:schemeClr val="accent1"/>
-          </a:effectRef>
-          <a:fontRef idx="minor">
-            <a:schemeClr val="tx1"/>
-          </a:fontRef>
-        </p:style>
-      </p:cxnSp>
-      <p:cxnSp>
-        <p:nvCxnSpPr>
-          <p:cNvPr id="18" name="Straight Connector 17">
-            <a:extLst>
-              <a:ext uri="{FF2B5EF4-FFF2-40B4-BE49-F238E27FC236}">
-                <a16:creationId xmlns:a16="http://schemas.microsoft.com/office/drawing/2014/main" id="{C151DCB7-3C11-E9A3-203A-B3DCD391EA82}"/>
-              </a:ext>
-            </a:extLst>
-          </p:cNvPr>
-          <p:cNvCxnSpPr>
-            <a:cxnSpLocks/>
-          </p:cNvCxnSpPr>
-          <p:nvPr/>
-        </p:nvCxnSpPr>
-        <p:spPr>
-          <a:xfrm>
-            <a:off x="12494775" y="1796788"/>
-            <a:ext cx="1" cy="1162051"/>
-          </a:xfrm>
-          <a:prstGeom prst="line">
-            <a:avLst/>
-          </a:prstGeom>
-          <a:ln w="19050">
-            <a:solidFill>
-              <a:schemeClr val="tx1"/>
-            </a:solidFill>
-            <a:prstDash val="sysDash"/>
-            <a:headEnd w="lg" len="lg"/>
-            <a:tailEnd type="triangle" w="lg" len="lg"/>
-          </a:ln>
-        </p:spPr>
-        <p:style>
-          <a:lnRef idx="1">
-            <a:schemeClr val="accent1"/>
-          </a:lnRef>
-          <a:fillRef idx="0">
-            <a:schemeClr val="accent1"/>
-          </a:fillRef>
-          <a:effectRef idx="0">
-            <a:schemeClr val="accent1"/>
-          </a:effectRef>
-          <a:fontRef idx="minor">
-            <a:schemeClr val="tx1"/>
-          </a:fontRef>
-        </p:style>
-      </p:cxnSp>
-      <p:cxnSp>
-        <p:nvCxnSpPr>
-          <p:cNvPr id="19" name="Straight Connector 18">
-            <a:extLst>
-              <a:ext uri="{FF2B5EF4-FFF2-40B4-BE49-F238E27FC236}">
-                <a16:creationId xmlns:a16="http://schemas.microsoft.com/office/drawing/2014/main" id="{C53507D4-1C1A-4455-951F-65617206F665}"/>
-              </a:ext>
-            </a:extLst>
-          </p:cNvPr>
-          <p:cNvCxnSpPr>
-            <a:cxnSpLocks/>
-            <a:stCxn id="10" idx="3"/>
-          </p:cNvCxnSpPr>
-          <p:nvPr/>
-        </p:nvCxnSpPr>
-        <p:spPr>
-          <a:xfrm>
-            <a:off x="13618133" y="3331027"/>
-            <a:ext cx="345244" cy="0"/>
-          </a:xfrm>
-          <a:prstGeom prst="line">
-            <a:avLst/>
-          </a:prstGeom>
-          <a:ln w="19050">
-            <a:solidFill>
-              <a:schemeClr val="tx1"/>
-            </a:solidFill>
-            <a:prstDash val="solid"/>
-            <a:headEnd w="lg" len="lg"/>
-            <a:tailEnd type="triangle" w="lg" len="lg"/>
-          </a:ln>
-        </p:spPr>
-        <p:style>
-          <a:lnRef idx="1">
-            <a:schemeClr val="accent1"/>
-          </a:lnRef>
-          <a:fillRef idx="0">
-            <a:schemeClr val="accent1"/>
-          </a:fillRef>
-          <a:effectRef idx="0">
-            <a:schemeClr val="accent1"/>
-          </a:effectRef>
-          <a:fontRef idx="minor">
-            <a:schemeClr val="tx1"/>
-          </a:fontRef>
-        </p:style>
-      </p:cxnSp>
-      <p:sp>
-        <p:nvSpPr>
-          <p:cNvPr id="20" name="Pentagon 19">
-            <a:extLst>
-              <a:ext uri="{FF2B5EF4-FFF2-40B4-BE49-F238E27FC236}">
-                <a16:creationId xmlns:a16="http://schemas.microsoft.com/office/drawing/2014/main" id="{7139832F-3762-FD86-F5A0-D408F4FBA22B}"/>
-              </a:ext>
-            </a:extLst>
-          </p:cNvPr>
-          <p:cNvSpPr/>
-          <p:nvPr/>
-        </p:nvSpPr>
-        <p:spPr>
-          <a:xfrm>
-            <a:off x="1519728" y="1374544"/>
-            <a:ext cx="6271404" cy="253309"/>
-          </a:xfrm>
-          <a:prstGeom prst="homePlate">
-            <a:avLst/>
-          </a:prstGeom>
-          <a:noFill/>
-          <a:ln>
-            <a:solidFill>
-              <a:schemeClr val="tx1"/>
-            </a:solidFill>
-          </a:ln>
-        </p:spPr>
-        <p:style>
-          <a:lnRef idx="2">
-            <a:schemeClr val="accent1">
-              <a:shade val="50000"/>
-            </a:schemeClr>
-          </a:lnRef>
-          <a:fillRef idx="1">
-            <a:schemeClr val="accent1"/>
-          </a:fillRef>
-          <a:effectRef idx="0">
-            <a:schemeClr val="accent1"/>
-          </a:effectRef>
-          <a:fontRef idx="minor">
-            <a:schemeClr val="lt1"/>
-          </a:fontRef>
-        </p:style>
-        <p:txBody>
-          <a:bodyPr rtlCol="0" anchor="ctr"/>
-          <a:lstStyle/>
-          <a:p>
-            <a:pPr algn="ctr"/>
-            <a:r>
-              <a:rPr lang="en-GB" sz="1500" dirty="0">
-                <a:solidFill>
-                  <a:schemeClr val="tx1"/>
-                </a:solidFill>
-              </a:rPr>
-              <a:t>EB Development for Swarm</a:t>
-            </a:r>
-          </a:p>
-        </p:txBody>
-      </p:sp>
-      <p:sp>
-        <p:nvSpPr>
-          <p:cNvPr id="21" name="Pentagon 20">
-            <a:extLst>
-              <a:ext uri="{FF2B5EF4-FFF2-40B4-BE49-F238E27FC236}">
-                <a16:creationId xmlns:a16="http://schemas.microsoft.com/office/drawing/2014/main" id="{7926F862-D217-D18B-7952-3862F37E35AC}"/>
-              </a:ext>
-            </a:extLst>
-          </p:cNvPr>
-          <p:cNvSpPr/>
-          <p:nvPr/>
-        </p:nvSpPr>
-        <p:spPr>
-          <a:xfrm rot="10800000" flipV="1">
-            <a:off x="1519728" y="2747949"/>
-            <a:ext cx="6271404" cy="253309"/>
-          </a:xfrm>
-          <a:prstGeom prst="homePlate">
-            <a:avLst/>
-          </a:prstGeom>
-          <a:noFill/>
-          <a:ln>
-            <a:solidFill>
-              <a:schemeClr val="tx1"/>
-            </a:solidFill>
-          </a:ln>
-        </p:spPr>
-        <p:style>
-          <a:lnRef idx="2">
-            <a:schemeClr val="accent1">
-              <a:shade val="50000"/>
-            </a:schemeClr>
-          </a:lnRef>
-          <a:fillRef idx="1">
-            <a:schemeClr val="accent1"/>
-          </a:fillRef>
-          <a:effectRef idx="0">
-            <a:schemeClr val="accent1"/>
-          </a:effectRef>
-          <a:fontRef idx="minor">
-            <a:schemeClr val="lt1"/>
-          </a:fontRef>
-        </p:style>
-        <p:txBody>
-          <a:bodyPr rtlCol="0" anchor="ctr"/>
-          <a:lstStyle/>
-          <a:p>
-            <a:pPr algn="ctr"/>
-            <a:r>
-              <a:rPr lang="en-GB" sz="1500" dirty="0">
-                <a:solidFill>
-                  <a:schemeClr val="tx1"/>
-                </a:solidFill>
-              </a:rPr>
-              <a:t>Feedback and Iterate</a:t>
-            </a:r>
-          </a:p>
-        </p:txBody>
-      </p:sp>
-      <p:sp>
-        <p:nvSpPr>
-          <p:cNvPr id="22" name="Folded Corner 10">
-            <a:extLst>
-              <a:ext uri="{FF2B5EF4-FFF2-40B4-BE49-F238E27FC236}">
-                <a16:creationId xmlns:a16="http://schemas.microsoft.com/office/drawing/2014/main" id="{146B4507-45FD-C9D3-F922-B7D4BA230CA9}"/>
-              </a:ext>
-            </a:extLst>
-          </p:cNvPr>
-          <p:cNvSpPr/>
-          <p:nvPr/>
-        </p:nvSpPr>
-        <p:spPr>
-          <a:xfrm rot="16200000">
-            <a:off x="616654" y="1716162"/>
-            <a:ext cx="562845" cy="949904"/>
-          </a:xfrm>
-          <a:prstGeom prst="foldedCorner">
-            <a:avLst>
-              <a:gd name="adj" fmla="val 32707"/>
-            </a:avLst>
-          </a:prstGeom>
-          <a:noFill/>
           <a:ln w="19050">
             <a:solidFill>
               <a:schemeClr val="tx1"/>
@@ -22360,123 +22046,26 @@
           <a:lstStyle/>
           <a:p>
             <a:pPr algn="ctr"/>
-            <a:endParaRPr lang="en-GB" sz="1000" dirty="0">
-              <a:solidFill>
-                <a:schemeClr val="tx1"/>
-              </a:solidFill>
-            </a:endParaRPr>
+            <a:endParaRPr lang="en-GB" sz="1000"/>
           </a:p>
         </p:txBody>
       </p:sp>
       <p:sp>
         <p:nvSpPr>
-          <p:cNvPr id="23" name="TextBox 22">
-            <a:extLst>
-              <a:ext uri="{FF2B5EF4-FFF2-40B4-BE49-F238E27FC236}">
-                <a16:creationId xmlns:a16="http://schemas.microsoft.com/office/drawing/2014/main" id="{B89C7E3E-BC41-4A58-E0E9-00BD1B61B295}"/>
-              </a:ext>
-            </a:extLst>
-          </p:cNvPr>
-          <p:cNvSpPr txBox="1"/>
+          <p:cNvPr id="48" name="Rectangle 47">
+            <a:extLst>
+              <a:ext uri="{FF2B5EF4-FFF2-40B4-BE49-F238E27FC236}">
+                <a16:creationId xmlns:a16="http://schemas.microsoft.com/office/drawing/2014/main" id="{6F163BBD-254F-0F75-E9F2-2504654EAF1B}"/>
+              </a:ext>
+            </a:extLst>
+          </p:cNvPr>
+          <p:cNvSpPr/>
           <p:nvPr/>
         </p:nvSpPr>
         <p:spPr>
           <a:xfrm>
-            <a:off x="327021" y="1953222"/>
-            <a:ext cx="1141377" cy="467179"/>
-          </a:xfrm>
-          <a:prstGeom prst="rect">
-            <a:avLst/>
-          </a:prstGeom>
-          <a:noFill/>
-        </p:spPr>
-        <p:txBody>
-          <a:bodyPr wrap="square" lIns="0" tIns="0" rIns="0" bIns="0" rtlCol="0" anchor="t">
-            <a:spAutoFit/>
-          </a:bodyPr>
-          <a:lstStyle/>
-          <a:p>
-            <a:pPr algn="ctr">
-              <a:lnSpc>
-                <a:spcPts val="1200"/>
-              </a:lnSpc>
-            </a:pPr>
-            <a:r>
-              <a:rPr lang="en-GB" sz="1300" dirty="0"/>
-              <a:t>System</a:t>
-            </a:r>
-            <a:br>
-              <a:rPr lang="en-GB" sz="1300" dirty="0"/>
-            </a:br>
-            <a:r>
-              <a:rPr lang="en-GB" sz="1300" dirty="0"/>
-              <a:t>Safety Requirements</a:t>
-            </a:r>
-            <a:endParaRPr lang="en-GB" sz="1300" dirty="0">
-              <a:cs typeface="Arial"/>
-            </a:endParaRPr>
-          </a:p>
-        </p:txBody>
-      </p:sp>
-      <p:sp>
-        <p:nvSpPr>
-          <p:cNvPr id="25" name="TextBox 24">
-            <a:extLst>
-              <a:ext uri="{FF2B5EF4-FFF2-40B4-BE49-F238E27FC236}">
-                <a16:creationId xmlns:a16="http://schemas.microsoft.com/office/drawing/2014/main" id="{B8C47711-8D23-945B-BC1B-DFF01D990A6C}"/>
-              </a:ext>
-            </a:extLst>
-          </p:cNvPr>
-          <p:cNvSpPr txBox="1"/>
-          <p:nvPr/>
-        </p:nvSpPr>
-        <p:spPr>
-          <a:xfrm>
-            <a:off x="7914355" y="2002025"/>
-            <a:ext cx="1081596" cy="436402"/>
-          </a:xfrm>
-          <a:prstGeom prst="rect">
-            <a:avLst/>
-          </a:prstGeom>
-          <a:noFill/>
-        </p:spPr>
-        <p:txBody>
-          <a:bodyPr wrap="square" lIns="121920" tIns="60960" rIns="121920" bIns="60960" rtlCol="0" anchor="t">
-            <a:spAutoFit/>
-          </a:bodyPr>
-          <a:lstStyle/>
-          <a:p>
-            <a:pPr algn="ctr">
-              <a:lnSpc>
-                <a:spcPts val="1200"/>
-              </a:lnSpc>
-            </a:pPr>
-            <a:r>
-              <a:rPr lang="en-GB" sz="1300" dirty="0"/>
-              <a:t>Safety Case for Swarm </a:t>
-            </a:r>
-            <a:endParaRPr lang="en-GB" sz="1300" dirty="0">
-              <a:cs typeface="Arial"/>
-            </a:endParaRPr>
-          </a:p>
-        </p:txBody>
-      </p:sp>
-      <p:sp>
-        <p:nvSpPr>
-          <p:cNvPr id="26" name="Rectangle 25">
-            <a:extLst>
-              <a:ext uri="{FF2B5EF4-FFF2-40B4-BE49-F238E27FC236}">
-                <a16:creationId xmlns:a16="http://schemas.microsoft.com/office/drawing/2014/main" id="{99C0E08C-F17F-CC82-E0BA-47A6439B919D}"/>
-              </a:ext>
-            </a:extLst>
-          </p:cNvPr>
-          <p:cNvSpPr/>
-          <p:nvPr/>
-        </p:nvSpPr>
-        <p:spPr>
-          <a:xfrm>
-            <a:off x="1521665" y="1899760"/>
-            <a:ext cx="925198" cy="582302"/>
+            <a:off x="5842983" y="1893740"/>
+            <a:ext cx="925198" cy="497572"/>
           </a:xfrm>
           <a:prstGeom prst="rect">
             <a:avLst/>
@@ -22524,103 +22113,20 @@
       </p:sp>
       <p:sp>
         <p:nvSpPr>
-          <p:cNvPr id="27" name="TextBox 26">
-            <a:extLst>
-              <a:ext uri="{FF2B5EF4-FFF2-40B4-BE49-F238E27FC236}">
-                <a16:creationId xmlns:a16="http://schemas.microsoft.com/office/drawing/2014/main" id="{0E265C16-09EF-7DD6-2482-15202AF1B819}"/>
-              </a:ext>
-            </a:extLst>
-          </p:cNvPr>
-          <p:cNvSpPr txBox="1"/>
+          <p:cNvPr id="50" name="Rectangle 49">
+            <a:extLst>
+              <a:ext uri="{FF2B5EF4-FFF2-40B4-BE49-F238E27FC236}">
+                <a16:creationId xmlns:a16="http://schemas.microsoft.com/office/drawing/2014/main" id="{66F193F2-AA54-C29E-D7D5-F953F0B81960}"/>
+              </a:ext>
+            </a:extLst>
+          </p:cNvPr>
+          <p:cNvSpPr/>
           <p:nvPr/>
         </p:nvSpPr>
         <p:spPr>
           <a:xfrm>
-            <a:off x="1533866" y="1919215"/>
-            <a:ext cx="906220" cy="562846"/>
-          </a:xfrm>
-          <a:prstGeom prst="rect">
-            <a:avLst/>
-          </a:prstGeom>
-          <a:solidFill>
-            <a:schemeClr val="bg2">
-              <a:lumMod val="90000"/>
-            </a:schemeClr>
-          </a:solidFill>
-        </p:spPr>
-        <p:txBody>
-          <a:bodyPr wrap="square" rtlCol="0">
-            <a:spAutoFit/>
-          </a:bodyPr>
-          <a:lstStyle/>
-          <a:p>
-            <a:pPr algn="ctr">
-              <a:lnSpc>
-                <a:spcPts val="1200"/>
-              </a:lnSpc>
-            </a:pPr>
-            <a:r>
-              <a:rPr lang="en-GB" sz="1200" dirty="0"/>
-              <a:t>1. EB Safety Assurance Scoping</a:t>
-            </a:r>
-          </a:p>
-        </p:txBody>
-      </p:sp>
-      <p:sp>
-        <p:nvSpPr>
-          <p:cNvPr id="30" name="TextBox 29">
-            <a:extLst>
-              <a:ext uri="{FF2B5EF4-FFF2-40B4-BE49-F238E27FC236}">
-                <a16:creationId xmlns:a16="http://schemas.microsoft.com/office/drawing/2014/main" id="{3D0AE7D1-4CF3-3E18-CC42-9EE4EF8BFEB9}"/>
-              </a:ext>
-            </a:extLst>
-          </p:cNvPr>
-          <p:cNvSpPr txBox="1"/>
-          <p:nvPr/>
-        </p:nvSpPr>
-        <p:spPr>
-          <a:xfrm>
-            <a:off x="2390573" y="4508520"/>
-            <a:ext cx="6357668" cy="923330"/>
-          </a:xfrm>
-          <a:prstGeom prst="rect">
-            <a:avLst/>
-          </a:prstGeom>
-          <a:noFill/>
-        </p:spPr>
-        <p:txBody>
-          <a:bodyPr wrap="square">
-            <a:spAutoFit/>
-          </a:bodyPr>
-          <a:lstStyle/>
-          <a:p>
-            <a:r>
-              <a:rPr lang="en-GB" dirty="0" err="1"/>
-              <a:t>AERoS</a:t>
-            </a:r>
-            <a:r>
-              <a:rPr lang="en-GB" dirty="0"/>
-              <a:t> is iterative by design, and contains six stages where assurance activities are performed in parallel to the development activities. </a:t>
-            </a:r>
-          </a:p>
-        </p:txBody>
-      </p:sp>
-      <p:sp>
-        <p:nvSpPr>
-          <p:cNvPr id="42" name="Rectangle 41">
-            <a:extLst>
-              <a:ext uri="{FF2B5EF4-FFF2-40B4-BE49-F238E27FC236}">
-                <a16:creationId xmlns:a16="http://schemas.microsoft.com/office/drawing/2014/main" id="{8365D02E-AD75-C1F0-153E-78D39C0CD254}"/>
-              </a:ext>
-            </a:extLst>
-          </p:cNvPr>
-          <p:cNvSpPr/>
-          <p:nvPr/>
-        </p:nvSpPr>
-        <p:spPr>
-          <a:xfrm>
-            <a:off x="2606577" y="1894538"/>
-            <a:ext cx="925198" cy="582302"/>
+            <a:off x="6910643" y="1888518"/>
+            <a:ext cx="925198" cy="502794"/>
           </a:xfrm>
           <a:prstGeom prst="rect">
             <a:avLst/>
@@ -22666,12 +22172,104 @@
           </a:p>
         </p:txBody>
       </p:sp>
+      <p:cxnSp>
+        <p:nvCxnSpPr>
+          <p:cNvPr id="53" name="Straight Connector 52">
+            <a:extLst>
+              <a:ext uri="{FF2B5EF4-FFF2-40B4-BE49-F238E27FC236}">
+                <a16:creationId xmlns:a16="http://schemas.microsoft.com/office/drawing/2014/main" id="{E156901E-D064-938B-A053-94677106DE74}"/>
+              </a:ext>
+            </a:extLst>
+          </p:cNvPr>
+          <p:cNvCxnSpPr>
+            <a:cxnSpLocks/>
+          </p:cNvCxnSpPr>
+          <p:nvPr/>
+        </p:nvCxnSpPr>
+        <p:spPr>
+          <a:xfrm flipV="1">
+            <a:off x="1993571" y="1621311"/>
+            <a:ext cx="0" cy="270770"/>
+          </a:xfrm>
+          <a:prstGeom prst="line">
+            <a:avLst/>
+          </a:prstGeom>
+          <a:ln w="19050">
+            <a:solidFill>
+              <a:schemeClr val="tx1"/>
+            </a:solidFill>
+            <a:prstDash val="sysDot"/>
+            <a:headEnd type="stealth" w="lg" len="lg"/>
+            <a:tailEnd type="stealth" w="lg" len="lg"/>
+          </a:ln>
+        </p:spPr>
+        <p:style>
+          <a:lnRef idx="1">
+            <a:schemeClr val="accent1"/>
+          </a:lnRef>
+          <a:fillRef idx="0">
+            <a:schemeClr val="accent1"/>
+          </a:fillRef>
+          <a:effectRef idx="0">
+            <a:schemeClr val="accent1"/>
+          </a:effectRef>
+          <a:fontRef idx="minor">
+            <a:schemeClr val="tx1"/>
+          </a:fontRef>
+        </p:style>
+      </p:cxnSp>
+      <p:cxnSp>
+        <p:nvCxnSpPr>
+          <p:cNvPr id="55" name="Straight Connector 54">
+            <a:extLst>
+              <a:ext uri="{FF2B5EF4-FFF2-40B4-BE49-F238E27FC236}">
+                <a16:creationId xmlns:a16="http://schemas.microsoft.com/office/drawing/2014/main" id="{B3C5A03A-D2C4-7905-E021-054F39CB033C}"/>
+              </a:ext>
+            </a:extLst>
+          </p:cNvPr>
+          <p:cNvCxnSpPr>
+            <a:cxnSpLocks/>
+          </p:cNvCxnSpPr>
+          <p:nvPr/>
+        </p:nvCxnSpPr>
+        <p:spPr>
+          <a:xfrm flipV="1">
+            <a:off x="1984264" y="2387824"/>
+            <a:ext cx="0" cy="270770"/>
+          </a:xfrm>
+          <a:prstGeom prst="line">
+            <a:avLst/>
+          </a:prstGeom>
+          <a:ln w="19050">
+            <a:solidFill>
+              <a:schemeClr val="tx1"/>
+            </a:solidFill>
+            <a:prstDash val="sysDot"/>
+            <a:headEnd type="stealth" w="lg" len="lg"/>
+            <a:tailEnd type="stealth" w="lg" len="lg"/>
+          </a:ln>
+        </p:spPr>
+        <p:style>
+          <a:lnRef idx="1">
+            <a:schemeClr val="accent1"/>
+          </a:lnRef>
+          <a:fillRef idx="0">
+            <a:schemeClr val="accent1"/>
+          </a:fillRef>
+          <a:effectRef idx="0">
+            <a:schemeClr val="accent1"/>
+          </a:effectRef>
+          <a:fontRef idx="minor">
+            <a:schemeClr val="tx1"/>
+          </a:fontRef>
+        </p:style>
+      </p:cxnSp>
       <p:sp>
         <p:nvSpPr>
-          <p:cNvPr id="43" name="TextBox 42">
-            <a:extLst>
-              <a:ext uri="{FF2B5EF4-FFF2-40B4-BE49-F238E27FC236}">
-                <a16:creationId xmlns:a16="http://schemas.microsoft.com/office/drawing/2014/main" id="{63C851F2-A598-E070-4AFF-A62C26A7CAB0}"/>
+          <p:cNvPr id="56" name="TextBox 55">
+            <a:extLst>
+              <a:ext uri="{FF2B5EF4-FFF2-40B4-BE49-F238E27FC236}">
+                <a16:creationId xmlns:a16="http://schemas.microsoft.com/office/drawing/2014/main" id="{DA44A2E7-CC87-1C79-DEDB-0B5F5919D3B0}"/>
               </a:ext>
             </a:extLst>
           </p:cNvPr>
@@ -22680,17 +22278,13 @@
         </p:nvSpPr>
         <p:spPr>
           <a:xfrm>
-            <a:off x="2611692" y="1976762"/>
-            <a:ext cx="906220" cy="461665"/>
+            <a:off x="3705434" y="1975645"/>
+            <a:ext cx="911653" cy="313291"/>
           </a:xfrm>
           <a:prstGeom prst="rect">
             <a:avLst/>
           </a:prstGeom>
-          <a:solidFill>
-            <a:schemeClr val="bg2">
-              <a:lumMod val="90000"/>
-            </a:schemeClr>
-          </a:solidFill>
+          <a:noFill/>
         </p:spPr>
         <p:txBody>
           <a:bodyPr wrap="square" lIns="0" tIns="0" rIns="0" bIns="0" rtlCol="0">
@@ -22704,18 +22298,736 @@
               </a:lnSpc>
             </a:pPr>
             <a:r>
-              <a:rPr lang="en-GB" sz="1200" dirty="0"/>
-              <a:t>2. EB Safety Requirements Assurance</a:t>
+              <a:rPr lang="en-GB" sz="1300" dirty="0"/>
+              <a:t>3. Data Management</a:t>
             </a:r>
           </a:p>
         </p:txBody>
       </p:sp>
       <p:sp>
         <p:nvSpPr>
-          <p:cNvPr id="44" name="Rectangle 43">
-            <a:extLst>
-              <a:ext uri="{FF2B5EF4-FFF2-40B4-BE49-F238E27FC236}">
-                <a16:creationId xmlns:a16="http://schemas.microsoft.com/office/drawing/2014/main" id="{8017490D-35E8-8F6C-1328-B376B343D3A0}"/>
+          <p:cNvPr id="57" name="TextBox 56">
+            <a:extLst>
+              <a:ext uri="{FF2B5EF4-FFF2-40B4-BE49-F238E27FC236}">
+                <a16:creationId xmlns:a16="http://schemas.microsoft.com/office/drawing/2014/main" id="{67E32EA5-6EF8-644D-41F9-6FEF327E5F2C}"/>
+              </a:ext>
+            </a:extLst>
+          </p:cNvPr>
+          <p:cNvSpPr txBox="1"/>
+          <p:nvPr/>
+        </p:nvSpPr>
+        <p:spPr>
+          <a:xfrm>
+            <a:off x="4809530" y="2070538"/>
+            <a:ext cx="857934" cy="159403"/>
+          </a:xfrm>
+          <a:prstGeom prst="rect">
+            <a:avLst/>
+          </a:prstGeom>
+          <a:noFill/>
+        </p:spPr>
+        <p:txBody>
+          <a:bodyPr wrap="square" lIns="0" tIns="0" rIns="0" bIns="0" rtlCol="0">
+            <a:spAutoFit/>
+          </a:bodyPr>
+          <a:lstStyle/>
+          <a:p>
+            <a:pPr algn="ctr">
+              <a:lnSpc>
+                <a:spcPts val="1200"/>
+              </a:lnSpc>
+            </a:pPr>
+            <a:r>
+              <a:rPr lang="en-GB" sz="1300" dirty="0"/>
+              <a:t>4. Model EB</a:t>
+            </a:r>
+          </a:p>
+        </p:txBody>
+      </p:sp>
+      <p:sp>
+        <p:nvSpPr>
+          <p:cNvPr id="58" name="TextBox 57">
+            <a:extLst>
+              <a:ext uri="{FF2B5EF4-FFF2-40B4-BE49-F238E27FC236}">
+                <a16:creationId xmlns:a16="http://schemas.microsoft.com/office/drawing/2014/main" id="{276C5D89-067B-7003-467B-34075BACA9C6}"/>
+              </a:ext>
+            </a:extLst>
+          </p:cNvPr>
+          <p:cNvSpPr txBox="1"/>
+          <p:nvPr/>
+        </p:nvSpPr>
+        <p:spPr>
+          <a:xfrm>
+            <a:off x="5896558" y="1982475"/>
+            <a:ext cx="819482" cy="313291"/>
+          </a:xfrm>
+          <a:prstGeom prst="rect">
+            <a:avLst/>
+          </a:prstGeom>
+          <a:noFill/>
+        </p:spPr>
+        <p:txBody>
+          <a:bodyPr wrap="square" lIns="0" tIns="0" rIns="0" bIns="0" rtlCol="0">
+            <a:spAutoFit/>
+          </a:bodyPr>
+          <a:lstStyle/>
+          <a:p>
+            <a:pPr algn="ctr">
+              <a:lnSpc>
+                <a:spcPts val="1200"/>
+              </a:lnSpc>
+            </a:pPr>
+            <a:r>
+              <a:rPr lang="en-GB" sz="1300" dirty="0"/>
+              <a:t>5. Model Verification</a:t>
+            </a:r>
+          </a:p>
+        </p:txBody>
+      </p:sp>
+      <p:sp>
+        <p:nvSpPr>
+          <p:cNvPr id="59" name="TextBox 58">
+            <a:extLst>
+              <a:ext uri="{FF2B5EF4-FFF2-40B4-BE49-F238E27FC236}">
+                <a16:creationId xmlns:a16="http://schemas.microsoft.com/office/drawing/2014/main" id="{8CBFD8D8-CB4D-75DA-1054-47679AAD7C6F}"/>
+              </a:ext>
+            </a:extLst>
+          </p:cNvPr>
+          <p:cNvSpPr txBox="1"/>
+          <p:nvPr/>
+        </p:nvSpPr>
+        <p:spPr>
+          <a:xfrm>
+            <a:off x="6951789" y="2001073"/>
+            <a:ext cx="857475" cy="313291"/>
+          </a:xfrm>
+          <a:prstGeom prst="rect">
+            <a:avLst/>
+          </a:prstGeom>
+          <a:noFill/>
+        </p:spPr>
+        <p:txBody>
+          <a:bodyPr wrap="square" lIns="0" tIns="0" rIns="0" bIns="0" rtlCol="0">
+            <a:spAutoFit/>
+          </a:bodyPr>
+          <a:lstStyle/>
+          <a:p>
+            <a:pPr algn="ctr">
+              <a:lnSpc>
+                <a:spcPts val="1200"/>
+              </a:lnSpc>
+            </a:pPr>
+            <a:r>
+              <a:rPr lang="en-GB" sz="1300" dirty="0"/>
+              <a:t>6. Model Deployment</a:t>
+            </a:r>
+          </a:p>
+        </p:txBody>
+      </p:sp>
+      <p:cxnSp>
+        <p:nvCxnSpPr>
+          <p:cNvPr id="60" name="Straight Connector 59">
+            <a:extLst>
+              <a:ext uri="{FF2B5EF4-FFF2-40B4-BE49-F238E27FC236}">
+                <a16:creationId xmlns:a16="http://schemas.microsoft.com/office/drawing/2014/main" id="{8E2A1278-82BD-DEED-A416-04B9FC2060B1}"/>
+              </a:ext>
+            </a:extLst>
+          </p:cNvPr>
+          <p:cNvCxnSpPr>
+            <a:cxnSpLocks/>
+          </p:cNvCxnSpPr>
+          <p:nvPr/>
+        </p:nvCxnSpPr>
+        <p:spPr>
+          <a:xfrm flipH="1">
+            <a:off x="2451585" y="2155229"/>
+            <a:ext cx="153589" cy="0"/>
+          </a:xfrm>
+          <a:prstGeom prst="line">
+            <a:avLst/>
+          </a:prstGeom>
+          <a:ln w="19050">
+            <a:solidFill>
+              <a:schemeClr val="tx1"/>
+            </a:solidFill>
+            <a:prstDash val="solid"/>
+            <a:headEnd type="stealth" w="lg" len="lg"/>
+            <a:tailEnd type="none" w="lg" len="lg"/>
+          </a:ln>
+        </p:spPr>
+        <p:style>
+          <a:lnRef idx="1">
+            <a:schemeClr val="accent1"/>
+          </a:lnRef>
+          <a:fillRef idx="0">
+            <a:schemeClr val="accent1"/>
+          </a:fillRef>
+          <a:effectRef idx="0">
+            <a:schemeClr val="accent1"/>
+          </a:effectRef>
+          <a:fontRef idx="minor">
+            <a:schemeClr val="tx1"/>
+          </a:fontRef>
+        </p:style>
+      </p:cxnSp>
+      <p:cxnSp>
+        <p:nvCxnSpPr>
+          <p:cNvPr id="63" name="Straight Connector 62">
+            <a:extLst>
+              <a:ext uri="{FF2B5EF4-FFF2-40B4-BE49-F238E27FC236}">
+                <a16:creationId xmlns:a16="http://schemas.microsoft.com/office/drawing/2014/main" id="{83796595-E5FC-2235-E748-3B44863D9B83}"/>
+              </a:ext>
+            </a:extLst>
+          </p:cNvPr>
+          <p:cNvCxnSpPr>
+            <a:cxnSpLocks/>
+          </p:cNvCxnSpPr>
+          <p:nvPr/>
+        </p:nvCxnSpPr>
+        <p:spPr>
+          <a:xfrm flipH="1">
+            <a:off x="3553424" y="2136396"/>
+            <a:ext cx="152339" cy="0"/>
+          </a:xfrm>
+          <a:prstGeom prst="line">
+            <a:avLst/>
+          </a:prstGeom>
+          <a:ln w="19050">
+            <a:solidFill>
+              <a:schemeClr val="tx1"/>
+            </a:solidFill>
+            <a:prstDash val="solid"/>
+            <a:headEnd type="stealth" w="lg" len="lg"/>
+            <a:tailEnd type="none" w="lg" len="lg"/>
+          </a:ln>
+        </p:spPr>
+        <p:style>
+          <a:lnRef idx="1">
+            <a:schemeClr val="accent1"/>
+          </a:lnRef>
+          <a:fillRef idx="0">
+            <a:schemeClr val="accent1"/>
+          </a:fillRef>
+          <a:effectRef idx="0">
+            <a:schemeClr val="accent1"/>
+          </a:effectRef>
+          <a:fontRef idx="minor">
+            <a:schemeClr val="tx1"/>
+          </a:fontRef>
+        </p:style>
+      </p:cxnSp>
+      <p:cxnSp>
+        <p:nvCxnSpPr>
+          <p:cNvPr id="71" name="Straight Connector 70">
+            <a:extLst>
+              <a:ext uri="{FF2B5EF4-FFF2-40B4-BE49-F238E27FC236}">
+                <a16:creationId xmlns:a16="http://schemas.microsoft.com/office/drawing/2014/main" id="{7D036AC3-69E3-7FCE-1719-E1C3540F5C14}"/>
+              </a:ext>
+            </a:extLst>
+          </p:cNvPr>
+          <p:cNvCxnSpPr>
+            <a:cxnSpLocks/>
+          </p:cNvCxnSpPr>
+          <p:nvPr/>
+        </p:nvCxnSpPr>
+        <p:spPr>
+          <a:xfrm flipH="1">
+            <a:off x="6775666" y="2169743"/>
+            <a:ext cx="134977" cy="0"/>
+          </a:xfrm>
+          <a:prstGeom prst="line">
+            <a:avLst/>
+          </a:prstGeom>
+          <a:ln w="19050">
+            <a:solidFill>
+              <a:schemeClr val="tx1"/>
+            </a:solidFill>
+            <a:prstDash val="solid"/>
+            <a:headEnd type="stealth" w="lg" len="lg"/>
+            <a:tailEnd type="none" w="lg" len="lg"/>
+          </a:ln>
+        </p:spPr>
+        <p:style>
+          <a:lnRef idx="1">
+            <a:schemeClr val="accent1"/>
+          </a:lnRef>
+          <a:fillRef idx="0">
+            <a:schemeClr val="accent1"/>
+          </a:fillRef>
+          <a:effectRef idx="0">
+            <a:schemeClr val="accent1"/>
+          </a:effectRef>
+          <a:fontRef idx="minor">
+            <a:schemeClr val="tx1"/>
+          </a:fontRef>
+        </p:style>
+      </p:cxnSp>
+      <p:cxnSp>
+        <p:nvCxnSpPr>
+          <p:cNvPr id="72" name="Straight Connector 71">
+            <a:extLst>
+              <a:ext uri="{FF2B5EF4-FFF2-40B4-BE49-F238E27FC236}">
+                <a16:creationId xmlns:a16="http://schemas.microsoft.com/office/drawing/2014/main" id="{4721D805-9AEC-C8F2-F8CB-BA56FB96699B}"/>
+              </a:ext>
+            </a:extLst>
+          </p:cNvPr>
+          <p:cNvCxnSpPr>
+            <a:cxnSpLocks/>
+          </p:cNvCxnSpPr>
+          <p:nvPr/>
+        </p:nvCxnSpPr>
+        <p:spPr>
+          <a:xfrm flipV="1">
+            <a:off x="3071422" y="1618362"/>
+            <a:ext cx="0" cy="270770"/>
+          </a:xfrm>
+          <a:prstGeom prst="line">
+            <a:avLst/>
+          </a:prstGeom>
+          <a:ln w="19050">
+            <a:solidFill>
+              <a:schemeClr val="tx1"/>
+            </a:solidFill>
+            <a:prstDash val="sysDot"/>
+            <a:headEnd type="stealth" w="lg" len="lg"/>
+            <a:tailEnd type="stealth" w="lg" len="lg"/>
+          </a:ln>
+        </p:spPr>
+        <p:style>
+          <a:lnRef idx="1">
+            <a:schemeClr val="accent1"/>
+          </a:lnRef>
+          <a:fillRef idx="0">
+            <a:schemeClr val="accent1"/>
+          </a:fillRef>
+          <a:effectRef idx="0">
+            <a:schemeClr val="accent1"/>
+          </a:effectRef>
+          <a:fontRef idx="minor">
+            <a:schemeClr val="tx1"/>
+          </a:fontRef>
+        </p:style>
+      </p:cxnSp>
+      <p:cxnSp>
+        <p:nvCxnSpPr>
+          <p:cNvPr id="73" name="Straight Connector 72">
+            <a:extLst>
+              <a:ext uri="{FF2B5EF4-FFF2-40B4-BE49-F238E27FC236}">
+                <a16:creationId xmlns:a16="http://schemas.microsoft.com/office/drawing/2014/main" id="{FA2A12A3-F852-68F9-B565-1B016F1B8A49}"/>
+              </a:ext>
+            </a:extLst>
+          </p:cNvPr>
+          <p:cNvCxnSpPr>
+            <a:cxnSpLocks/>
+          </p:cNvCxnSpPr>
+          <p:nvPr/>
+        </p:nvCxnSpPr>
+        <p:spPr>
+          <a:xfrm flipV="1">
+            <a:off x="4151587" y="1617748"/>
+            <a:ext cx="0" cy="270770"/>
+          </a:xfrm>
+          <a:prstGeom prst="line">
+            <a:avLst/>
+          </a:prstGeom>
+          <a:ln w="19050">
+            <a:solidFill>
+              <a:schemeClr val="tx1"/>
+            </a:solidFill>
+            <a:prstDash val="sysDot"/>
+            <a:headEnd type="stealth" w="lg" len="lg"/>
+            <a:tailEnd type="stealth" w="lg" len="lg"/>
+          </a:ln>
+        </p:spPr>
+        <p:style>
+          <a:lnRef idx="1">
+            <a:schemeClr val="accent1"/>
+          </a:lnRef>
+          <a:fillRef idx="0">
+            <a:schemeClr val="accent1"/>
+          </a:fillRef>
+          <a:effectRef idx="0">
+            <a:schemeClr val="accent1"/>
+          </a:effectRef>
+          <a:fontRef idx="minor">
+            <a:schemeClr val="tx1"/>
+          </a:fontRef>
+        </p:style>
+      </p:cxnSp>
+      <p:cxnSp>
+        <p:nvCxnSpPr>
+          <p:cNvPr id="74" name="Straight Connector 73">
+            <a:extLst>
+              <a:ext uri="{FF2B5EF4-FFF2-40B4-BE49-F238E27FC236}">
+                <a16:creationId xmlns:a16="http://schemas.microsoft.com/office/drawing/2014/main" id="{6F8D1740-4A82-E8B7-7084-80CB989C5A2C}"/>
+              </a:ext>
+            </a:extLst>
+          </p:cNvPr>
+          <p:cNvCxnSpPr>
+            <a:cxnSpLocks/>
+          </p:cNvCxnSpPr>
+          <p:nvPr/>
+        </p:nvCxnSpPr>
+        <p:spPr>
+          <a:xfrm flipV="1">
+            <a:off x="5232383" y="1613852"/>
+            <a:ext cx="0" cy="270770"/>
+          </a:xfrm>
+          <a:prstGeom prst="line">
+            <a:avLst/>
+          </a:prstGeom>
+          <a:ln w="19050">
+            <a:solidFill>
+              <a:schemeClr val="tx1"/>
+            </a:solidFill>
+            <a:prstDash val="sysDot"/>
+            <a:headEnd type="stealth" w="lg" len="lg"/>
+            <a:tailEnd type="stealth" w="lg" len="lg"/>
+          </a:ln>
+        </p:spPr>
+        <p:style>
+          <a:lnRef idx="1">
+            <a:schemeClr val="accent1"/>
+          </a:lnRef>
+          <a:fillRef idx="0">
+            <a:schemeClr val="accent1"/>
+          </a:fillRef>
+          <a:effectRef idx="0">
+            <a:schemeClr val="accent1"/>
+          </a:effectRef>
+          <a:fontRef idx="minor">
+            <a:schemeClr val="tx1"/>
+          </a:fontRef>
+        </p:style>
+      </p:cxnSp>
+      <p:cxnSp>
+        <p:nvCxnSpPr>
+          <p:cNvPr id="75" name="Straight Connector 74">
+            <a:extLst>
+              <a:ext uri="{FF2B5EF4-FFF2-40B4-BE49-F238E27FC236}">
+                <a16:creationId xmlns:a16="http://schemas.microsoft.com/office/drawing/2014/main" id="{D7618F92-4322-EED0-5174-BD1AED96DA09}"/>
+              </a:ext>
+            </a:extLst>
+          </p:cNvPr>
+          <p:cNvCxnSpPr>
+            <a:cxnSpLocks/>
+          </p:cNvCxnSpPr>
+          <p:nvPr/>
+        </p:nvCxnSpPr>
+        <p:spPr>
+          <a:xfrm flipV="1">
+            <a:off x="6281604" y="1624520"/>
+            <a:ext cx="0" cy="270770"/>
+          </a:xfrm>
+          <a:prstGeom prst="line">
+            <a:avLst/>
+          </a:prstGeom>
+          <a:ln w="19050">
+            <a:solidFill>
+              <a:schemeClr val="tx1"/>
+            </a:solidFill>
+            <a:prstDash val="sysDot"/>
+            <a:headEnd type="stealth" w="lg" len="lg"/>
+            <a:tailEnd type="stealth" w="lg" len="lg"/>
+          </a:ln>
+        </p:spPr>
+        <p:style>
+          <a:lnRef idx="1">
+            <a:schemeClr val="accent1"/>
+          </a:lnRef>
+          <a:fillRef idx="0">
+            <a:schemeClr val="accent1"/>
+          </a:fillRef>
+          <a:effectRef idx="0">
+            <a:schemeClr val="accent1"/>
+          </a:effectRef>
+          <a:fontRef idx="minor">
+            <a:schemeClr val="tx1"/>
+          </a:fontRef>
+        </p:style>
+      </p:cxnSp>
+      <p:cxnSp>
+        <p:nvCxnSpPr>
+          <p:cNvPr id="76" name="Straight Connector 75">
+            <a:extLst>
+              <a:ext uri="{FF2B5EF4-FFF2-40B4-BE49-F238E27FC236}">
+                <a16:creationId xmlns:a16="http://schemas.microsoft.com/office/drawing/2014/main" id="{CE8BBD98-AE3B-23A0-E337-A1087E06FE33}"/>
+              </a:ext>
+            </a:extLst>
+          </p:cNvPr>
+          <p:cNvCxnSpPr>
+            <a:cxnSpLocks/>
+          </p:cNvCxnSpPr>
+          <p:nvPr/>
+        </p:nvCxnSpPr>
+        <p:spPr>
+          <a:xfrm flipV="1">
+            <a:off x="7346061" y="1621311"/>
+            <a:ext cx="0" cy="270770"/>
+          </a:xfrm>
+          <a:prstGeom prst="line">
+            <a:avLst/>
+          </a:prstGeom>
+          <a:ln w="19050">
+            <a:solidFill>
+              <a:schemeClr val="tx1"/>
+            </a:solidFill>
+            <a:prstDash val="sysDot"/>
+            <a:headEnd type="stealth" w="lg" len="lg"/>
+            <a:tailEnd type="stealth" w="lg" len="lg"/>
+          </a:ln>
+        </p:spPr>
+        <p:style>
+          <a:lnRef idx="1">
+            <a:schemeClr val="accent1"/>
+          </a:lnRef>
+          <a:fillRef idx="0">
+            <a:schemeClr val="accent1"/>
+          </a:fillRef>
+          <a:effectRef idx="0">
+            <a:schemeClr val="accent1"/>
+          </a:effectRef>
+          <a:fontRef idx="minor">
+            <a:schemeClr val="tx1"/>
+          </a:fontRef>
+        </p:style>
+      </p:cxnSp>
+      <p:cxnSp>
+        <p:nvCxnSpPr>
+          <p:cNvPr id="77" name="Straight Connector 76">
+            <a:extLst>
+              <a:ext uri="{FF2B5EF4-FFF2-40B4-BE49-F238E27FC236}">
+                <a16:creationId xmlns:a16="http://schemas.microsoft.com/office/drawing/2014/main" id="{7F636869-032B-D32D-E52A-AAE3271F1B61}"/>
+              </a:ext>
+            </a:extLst>
+          </p:cNvPr>
+          <p:cNvCxnSpPr>
+            <a:cxnSpLocks/>
+          </p:cNvCxnSpPr>
+          <p:nvPr/>
+        </p:nvCxnSpPr>
+        <p:spPr>
+          <a:xfrm flipV="1">
+            <a:off x="3073528" y="2386371"/>
+            <a:ext cx="0" cy="270770"/>
+          </a:xfrm>
+          <a:prstGeom prst="line">
+            <a:avLst/>
+          </a:prstGeom>
+          <a:ln w="19050">
+            <a:solidFill>
+              <a:schemeClr val="tx1"/>
+            </a:solidFill>
+            <a:prstDash val="sysDot"/>
+            <a:headEnd type="stealth" w="lg" len="lg"/>
+            <a:tailEnd type="stealth" w="lg" len="lg"/>
+          </a:ln>
+        </p:spPr>
+        <p:style>
+          <a:lnRef idx="1">
+            <a:schemeClr val="accent1"/>
+          </a:lnRef>
+          <a:fillRef idx="0">
+            <a:schemeClr val="accent1"/>
+          </a:fillRef>
+          <a:effectRef idx="0">
+            <a:schemeClr val="accent1"/>
+          </a:effectRef>
+          <a:fontRef idx="minor">
+            <a:schemeClr val="tx1"/>
+          </a:fontRef>
+        </p:style>
+      </p:cxnSp>
+      <p:cxnSp>
+        <p:nvCxnSpPr>
+          <p:cNvPr id="78" name="Straight Connector 77">
+            <a:extLst>
+              <a:ext uri="{FF2B5EF4-FFF2-40B4-BE49-F238E27FC236}">
+                <a16:creationId xmlns:a16="http://schemas.microsoft.com/office/drawing/2014/main" id="{9611A07D-9C32-C7FA-0F94-4D51B3ED2DFF}"/>
+              </a:ext>
+            </a:extLst>
+          </p:cNvPr>
+          <p:cNvCxnSpPr>
+            <a:cxnSpLocks/>
+          </p:cNvCxnSpPr>
+          <p:nvPr/>
+        </p:nvCxnSpPr>
+        <p:spPr>
+          <a:xfrm flipV="1">
+            <a:off x="4151236" y="2388038"/>
+            <a:ext cx="0" cy="270770"/>
+          </a:xfrm>
+          <a:prstGeom prst="line">
+            <a:avLst/>
+          </a:prstGeom>
+          <a:ln w="19050">
+            <a:solidFill>
+              <a:schemeClr val="tx1"/>
+            </a:solidFill>
+            <a:prstDash val="sysDot"/>
+            <a:headEnd type="stealth" w="lg" len="lg"/>
+            <a:tailEnd type="stealth" w="lg" len="lg"/>
+          </a:ln>
+        </p:spPr>
+        <p:style>
+          <a:lnRef idx="1">
+            <a:schemeClr val="accent1"/>
+          </a:lnRef>
+          <a:fillRef idx="0">
+            <a:schemeClr val="accent1"/>
+          </a:fillRef>
+          <a:effectRef idx="0">
+            <a:schemeClr val="accent1"/>
+          </a:effectRef>
+          <a:fontRef idx="minor">
+            <a:schemeClr val="tx1"/>
+          </a:fontRef>
+        </p:style>
+      </p:cxnSp>
+      <p:cxnSp>
+        <p:nvCxnSpPr>
+          <p:cNvPr id="79" name="Straight Connector 78">
+            <a:extLst>
+              <a:ext uri="{FF2B5EF4-FFF2-40B4-BE49-F238E27FC236}">
+                <a16:creationId xmlns:a16="http://schemas.microsoft.com/office/drawing/2014/main" id="{106B37EC-B91D-C22D-3879-FE1608085D6A}"/>
+              </a:ext>
+            </a:extLst>
+          </p:cNvPr>
+          <p:cNvCxnSpPr>
+            <a:cxnSpLocks/>
+          </p:cNvCxnSpPr>
+          <p:nvPr/>
+        </p:nvCxnSpPr>
+        <p:spPr>
+          <a:xfrm flipV="1">
+            <a:off x="5242285" y="2388824"/>
+            <a:ext cx="0" cy="270770"/>
+          </a:xfrm>
+          <a:prstGeom prst="line">
+            <a:avLst/>
+          </a:prstGeom>
+          <a:ln w="19050">
+            <a:solidFill>
+              <a:schemeClr val="tx1"/>
+            </a:solidFill>
+            <a:prstDash val="sysDot"/>
+            <a:headEnd type="stealth" w="lg" len="lg"/>
+            <a:tailEnd type="stealth" w="lg" len="lg"/>
+          </a:ln>
+        </p:spPr>
+        <p:style>
+          <a:lnRef idx="1">
+            <a:schemeClr val="accent1"/>
+          </a:lnRef>
+          <a:fillRef idx="0">
+            <a:schemeClr val="accent1"/>
+          </a:fillRef>
+          <a:effectRef idx="0">
+            <a:schemeClr val="accent1"/>
+          </a:effectRef>
+          <a:fontRef idx="minor">
+            <a:schemeClr val="tx1"/>
+          </a:fontRef>
+        </p:style>
+      </p:cxnSp>
+      <p:cxnSp>
+        <p:nvCxnSpPr>
+          <p:cNvPr id="80" name="Straight Connector 79">
+            <a:extLst>
+              <a:ext uri="{FF2B5EF4-FFF2-40B4-BE49-F238E27FC236}">
+                <a16:creationId xmlns:a16="http://schemas.microsoft.com/office/drawing/2014/main" id="{2F895141-1C8D-9509-839B-3FD6FD8B549B}"/>
+              </a:ext>
+            </a:extLst>
+          </p:cNvPr>
+          <p:cNvCxnSpPr>
+            <a:cxnSpLocks/>
+          </p:cNvCxnSpPr>
+          <p:nvPr/>
+        </p:nvCxnSpPr>
+        <p:spPr>
+          <a:xfrm flipV="1">
+            <a:off x="6300132" y="2381584"/>
+            <a:ext cx="0" cy="270770"/>
+          </a:xfrm>
+          <a:prstGeom prst="line">
+            <a:avLst/>
+          </a:prstGeom>
+          <a:ln w="19050">
+            <a:solidFill>
+              <a:schemeClr val="tx1"/>
+            </a:solidFill>
+            <a:prstDash val="sysDot"/>
+            <a:headEnd type="stealth" w="lg" len="lg"/>
+            <a:tailEnd type="stealth" w="lg" len="lg"/>
+          </a:ln>
+        </p:spPr>
+        <p:style>
+          <a:lnRef idx="1">
+            <a:schemeClr val="accent1"/>
+          </a:lnRef>
+          <a:fillRef idx="0">
+            <a:schemeClr val="accent1"/>
+          </a:fillRef>
+          <a:effectRef idx="0">
+            <a:schemeClr val="accent1"/>
+          </a:effectRef>
+          <a:fontRef idx="minor">
+            <a:schemeClr val="tx1"/>
+          </a:fontRef>
+        </p:style>
+      </p:cxnSp>
+      <p:cxnSp>
+        <p:nvCxnSpPr>
+          <p:cNvPr id="81" name="Straight Connector 80">
+            <a:extLst>
+              <a:ext uri="{FF2B5EF4-FFF2-40B4-BE49-F238E27FC236}">
+                <a16:creationId xmlns:a16="http://schemas.microsoft.com/office/drawing/2014/main" id="{38596753-00A2-8599-8475-249D5E170184}"/>
+              </a:ext>
+            </a:extLst>
+          </p:cNvPr>
+          <p:cNvCxnSpPr>
+            <a:cxnSpLocks/>
+          </p:cNvCxnSpPr>
+          <p:nvPr/>
+        </p:nvCxnSpPr>
+        <p:spPr>
+          <a:xfrm flipV="1">
+            <a:off x="7346035" y="2387824"/>
+            <a:ext cx="0" cy="270770"/>
+          </a:xfrm>
+          <a:prstGeom prst="line">
+            <a:avLst/>
+          </a:prstGeom>
+          <a:ln w="19050">
+            <a:solidFill>
+              <a:schemeClr val="tx1"/>
+            </a:solidFill>
+            <a:prstDash val="sysDot"/>
+            <a:headEnd type="stealth" w="lg" len="lg"/>
+            <a:tailEnd type="stealth" w="lg" len="lg"/>
+          </a:ln>
+        </p:spPr>
+        <p:style>
+          <a:lnRef idx="1">
+            <a:schemeClr val="accent1"/>
+          </a:lnRef>
+          <a:fillRef idx="0">
+            <a:schemeClr val="accent1"/>
+          </a:fillRef>
+          <a:effectRef idx="0">
+            <a:schemeClr val="accent1"/>
+          </a:effectRef>
+          <a:fontRef idx="minor">
+            <a:schemeClr val="tx1"/>
+          </a:fontRef>
+        </p:style>
+      </p:cxnSp>
+      <p:sp>
+        <p:nvSpPr>
+          <p:cNvPr id="93" name="Folded Corner 10">
+            <a:extLst>
+              <a:ext uri="{FF2B5EF4-FFF2-40B4-BE49-F238E27FC236}">
+                <a16:creationId xmlns:a16="http://schemas.microsoft.com/office/drawing/2014/main" id="{987AB72A-6933-EF8B-990E-704B5FF325C4}"/>
               </a:ext>
             </a:extLst>
           </p:cNvPr>
@@ -22723,18 +23035,16 @@
           <p:nvPr/>
         </p:nvSpPr>
         <p:spPr>
-          <a:xfrm>
-            <a:off x="3694774" y="1894538"/>
-            <a:ext cx="925198" cy="582302"/>
-          </a:xfrm>
-          <a:prstGeom prst="rect">
-            <a:avLst/>
-          </a:prstGeom>
-          <a:solidFill>
-            <a:schemeClr val="bg2">
-              <a:lumMod val="90000"/>
-            </a:schemeClr>
-          </a:solidFill>
+          <a:xfrm rot="16200000">
+            <a:off x="8208939" y="1676147"/>
+            <a:ext cx="498585" cy="925196"/>
+          </a:xfrm>
+          <a:prstGeom prst="foldedCorner">
+            <a:avLst>
+              <a:gd name="adj" fmla="val 32707"/>
+            </a:avLst>
+          </a:prstGeom>
+          <a:noFill/>
           <a:ln w="19050">
             <a:solidFill>
               <a:schemeClr val="tx1"/>
@@ -22767,1114 +23077,6 @@
           <a:lstStyle/>
           <a:p>
             <a:pPr algn="ctr"/>
-            <a:endParaRPr lang="en-GB" sz="1000"/>
-          </a:p>
-        </p:txBody>
-      </p:sp>
-      <p:sp>
-        <p:nvSpPr>
-          <p:cNvPr id="46" name="Rectangle 45">
-            <a:extLst>
-              <a:ext uri="{FF2B5EF4-FFF2-40B4-BE49-F238E27FC236}">
-                <a16:creationId xmlns:a16="http://schemas.microsoft.com/office/drawing/2014/main" id="{3FFE0581-B36F-AADE-156E-B81C02467D2D}"/>
-              </a:ext>
-            </a:extLst>
-          </p:cNvPr>
-          <p:cNvSpPr/>
-          <p:nvPr/>
-        </p:nvSpPr>
-        <p:spPr>
-          <a:xfrm>
-            <a:off x="4779686" y="1889316"/>
-            <a:ext cx="925198" cy="582302"/>
-          </a:xfrm>
-          <a:prstGeom prst="rect">
-            <a:avLst/>
-          </a:prstGeom>
-          <a:solidFill>
-            <a:schemeClr val="bg2">
-              <a:lumMod val="90000"/>
-            </a:schemeClr>
-          </a:solidFill>
-          <a:ln w="19050">
-            <a:solidFill>
-              <a:schemeClr val="tx1"/>
-            </a:solidFill>
-          </a:ln>
-        </p:spPr>
-        <p:style>
-          <a:lnRef idx="2">
-            <a:schemeClr val="accent1">
-              <a:shade val="50000"/>
-            </a:schemeClr>
-          </a:lnRef>
-          <a:fillRef idx="1">
-            <a:schemeClr val="accent1"/>
-          </a:fillRef>
-          <a:effectRef idx="0">
-            <a:schemeClr val="accent1"/>
-          </a:effectRef>
-          <a:fontRef idx="minor">
-            <a:schemeClr val="lt1"/>
-          </a:fontRef>
-        </p:style>
-        <p:txBody>
-          <a:bodyPr rot="0" spcFirstLastPara="0" vertOverflow="overflow" horzOverflow="overflow" vert="horz" wrap="square" lIns="68580" tIns="34291" rIns="68580" bIns="34291" numCol="1" spcCol="0" rtlCol="0" fromWordArt="0" anchor="ctr" anchorCtr="0" forceAA="0" compatLnSpc="1">
-            <a:prstTxWarp prst="textNoShape">
-              <a:avLst/>
-            </a:prstTxWarp>
-            <a:noAutofit/>
-          </a:bodyPr>
-          <a:lstStyle/>
-          <a:p>
-            <a:pPr algn="ctr"/>
-            <a:endParaRPr lang="en-GB" sz="1000"/>
-          </a:p>
-        </p:txBody>
-      </p:sp>
-      <p:sp>
-        <p:nvSpPr>
-          <p:cNvPr id="48" name="Rectangle 47">
-            <a:extLst>
-              <a:ext uri="{FF2B5EF4-FFF2-40B4-BE49-F238E27FC236}">
-                <a16:creationId xmlns:a16="http://schemas.microsoft.com/office/drawing/2014/main" id="{6F163BBD-254F-0F75-E9F2-2504654EAF1B}"/>
-              </a:ext>
-            </a:extLst>
-          </p:cNvPr>
-          <p:cNvSpPr/>
-          <p:nvPr/>
-        </p:nvSpPr>
-        <p:spPr>
-          <a:xfrm>
-            <a:off x="5842983" y="1893740"/>
-            <a:ext cx="925198" cy="582302"/>
-          </a:xfrm>
-          <a:prstGeom prst="rect">
-            <a:avLst/>
-          </a:prstGeom>
-          <a:solidFill>
-            <a:schemeClr val="bg2">
-              <a:lumMod val="90000"/>
-            </a:schemeClr>
-          </a:solidFill>
-          <a:ln w="19050">
-            <a:solidFill>
-              <a:schemeClr val="tx1"/>
-            </a:solidFill>
-          </a:ln>
-        </p:spPr>
-        <p:style>
-          <a:lnRef idx="2">
-            <a:schemeClr val="accent1">
-              <a:shade val="50000"/>
-            </a:schemeClr>
-          </a:lnRef>
-          <a:fillRef idx="1">
-            <a:schemeClr val="accent1"/>
-          </a:fillRef>
-          <a:effectRef idx="0">
-            <a:schemeClr val="accent1"/>
-          </a:effectRef>
-          <a:fontRef idx="minor">
-            <a:schemeClr val="lt1"/>
-          </a:fontRef>
-        </p:style>
-        <p:txBody>
-          <a:bodyPr rot="0" spcFirstLastPara="0" vertOverflow="overflow" horzOverflow="overflow" vert="horz" wrap="square" lIns="68580" tIns="34291" rIns="68580" bIns="34291" numCol="1" spcCol="0" rtlCol="0" fromWordArt="0" anchor="ctr" anchorCtr="0" forceAA="0" compatLnSpc="1">
-            <a:prstTxWarp prst="textNoShape">
-              <a:avLst/>
-            </a:prstTxWarp>
-            <a:noAutofit/>
-          </a:bodyPr>
-          <a:lstStyle/>
-          <a:p>
-            <a:pPr algn="ctr"/>
-            <a:endParaRPr lang="en-GB" sz="1000"/>
-          </a:p>
-        </p:txBody>
-      </p:sp>
-      <p:sp>
-        <p:nvSpPr>
-          <p:cNvPr id="50" name="Rectangle 49">
-            <a:extLst>
-              <a:ext uri="{FF2B5EF4-FFF2-40B4-BE49-F238E27FC236}">
-                <a16:creationId xmlns:a16="http://schemas.microsoft.com/office/drawing/2014/main" id="{66F193F2-AA54-C29E-D7D5-F953F0B81960}"/>
-              </a:ext>
-            </a:extLst>
-          </p:cNvPr>
-          <p:cNvSpPr/>
-          <p:nvPr/>
-        </p:nvSpPr>
-        <p:spPr>
-          <a:xfrm>
-            <a:off x="6910643" y="1888518"/>
-            <a:ext cx="925198" cy="582302"/>
-          </a:xfrm>
-          <a:prstGeom prst="rect">
-            <a:avLst/>
-          </a:prstGeom>
-          <a:solidFill>
-            <a:schemeClr val="bg2">
-              <a:lumMod val="90000"/>
-            </a:schemeClr>
-          </a:solidFill>
-          <a:ln w="19050">
-            <a:solidFill>
-              <a:schemeClr val="tx1"/>
-            </a:solidFill>
-          </a:ln>
-        </p:spPr>
-        <p:style>
-          <a:lnRef idx="2">
-            <a:schemeClr val="accent1">
-              <a:shade val="50000"/>
-            </a:schemeClr>
-          </a:lnRef>
-          <a:fillRef idx="1">
-            <a:schemeClr val="accent1"/>
-          </a:fillRef>
-          <a:effectRef idx="0">
-            <a:schemeClr val="accent1"/>
-          </a:effectRef>
-          <a:fontRef idx="minor">
-            <a:schemeClr val="lt1"/>
-          </a:fontRef>
-        </p:style>
-        <p:txBody>
-          <a:bodyPr rot="0" spcFirstLastPara="0" vertOverflow="overflow" horzOverflow="overflow" vert="horz" wrap="square" lIns="68580" tIns="34291" rIns="68580" bIns="34291" numCol="1" spcCol="0" rtlCol="0" fromWordArt="0" anchor="ctr" anchorCtr="0" forceAA="0" compatLnSpc="1">
-            <a:prstTxWarp prst="textNoShape">
-              <a:avLst/>
-            </a:prstTxWarp>
-            <a:noAutofit/>
-          </a:bodyPr>
-          <a:lstStyle/>
-          <a:p>
-            <a:pPr algn="ctr"/>
-            <a:endParaRPr lang="en-GB" sz="1000"/>
-          </a:p>
-        </p:txBody>
-      </p:sp>
-      <p:cxnSp>
-        <p:nvCxnSpPr>
-          <p:cNvPr id="53" name="Straight Connector 52">
-            <a:extLst>
-              <a:ext uri="{FF2B5EF4-FFF2-40B4-BE49-F238E27FC236}">
-                <a16:creationId xmlns:a16="http://schemas.microsoft.com/office/drawing/2014/main" id="{E156901E-D064-938B-A053-94677106DE74}"/>
-              </a:ext>
-            </a:extLst>
-          </p:cNvPr>
-          <p:cNvCxnSpPr>
-            <a:cxnSpLocks/>
-          </p:cNvCxnSpPr>
-          <p:nvPr/>
-        </p:nvCxnSpPr>
-        <p:spPr>
-          <a:xfrm flipV="1">
-            <a:off x="1993571" y="1630885"/>
-            <a:ext cx="0" cy="270770"/>
-          </a:xfrm>
-          <a:prstGeom prst="line">
-            <a:avLst/>
-          </a:prstGeom>
-          <a:ln w="19050">
-            <a:solidFill>
-              <a:schemeClr val="tx1"/>
-            </a:solidFill>
-            <a:prstDash val="sysDot"/>
-            <a:headEnd type="stealth" w="lg" len="lg"/>
-            <a:tailEnd type="stealth" w="lg" len="lg"/>
-          </a:ln>
-        </p:spPr>
-        <p:style>
-          <a:lnRef idx="1">
-            <a:schemeClr val="accent1"/>
-          </a:lnRef>
-          <a:fillRef idx="0">
-            <a:schemeClr val="accent1"/>
-          </a:fillRef>
-          <a:effectRef idx="0">
-            <a:schemeClr val="accent1"/>
-          </a:effectRef>
-          <a:fontRef idx="minor">
-            <a:schemeClr val="tx1"/>
-          </a:fontRef>
-        </p:style>
-      </p:cxnSp>
-      <p:cxnSp>
-        <p:nvCxnSpPr>
-          <p:cNvPr id="55" name="Straight Connector 54">
-            <a:extLst>
-              <a:ext uri="{FF2B5EF4-FFF2-40B4-BE49-F238E27FC236}">
-                <a16:creationId xmlns:a16="http://schemas.microsoft.com/office/drawing/2014/main" id="{B3C5A03A-D2C4-7905-E021-054F39CB033C}"/>
-              </a:ext>
-            </a:extLst>
-          </p:cNvPr>
-          <p:cNvCxnSpPr>
-            <a:cxnSpLocks/>
-          </p:cNvCxnSpPr>
-          <p:nvPr/>
-        </p:nvCxnSpPr>
-        <p:spPr>
-          <a:xfrm flipV="1">
-            <a:off x="1984264" y="2477060"/>
-            <a:ext cx="0" cy="270770"/>
-          </a:xfrm>
-          <a:prstGeom prst="line">
-            <a:avLst/>
-          </a:prstGeom>
-          <a:ln w="19050">
-            <a:solidFill>
-              <a:schemeClr val="tx1"/>
-            </a:solidFill>
-            <a:prstDash val="sysDot"/>
-            <a:headEnd type="stealth" w="lg" len="lg"/>
-            <a:tailEnd type="stealth" w="lg" len="lg"/>
-          </a:ln>
-        </p:spPr>
-        <p:style>
-          <a:lnRef idx="1">
-            <a:schemeClr val="accent1"/>
-          </a:lnRef>
-          <a:fillRef idx="0">
-            <a:schemeClr val="accent1"/>
-          </a:fillRef>
-          <a:effectRef idx="0">
-            <a:schemeClr val="accent1"/>
-          </a:effectRef>
-          <a:fontRef idx="minor">
-            <a:schemeClr val="tx1"/>
-          </a:fontRef>
-        </p:style>
-      </p:cxnSp>
-      <p:sp>
-        <p:nvSpPr>
-          <p:cNvPr id="56" name="TextBox 55">
-            <a:extLst>
-              <a:ext uri="{FF2B5EF4-FFF2-40B4-BE49-F238E27FC236}">
-                <a16:creationId xmlns:a16="http://schemas.microsoft.com/office/drawing/2014/main" id="{DA44A2E7-CC87-1C79-DEDB-0B5F5919D3B0}"/>
-              </a:ext>
-            </a:extLst>
-          </p:cNvPr>
-          <p:cNvSpPr txBox="1"/>
-          <p:nvPr/>
-        </p:nvSpPr>
-        <p:spPr>
-          <a:xfrm>
-            <a:off x="3732010" y="2040298"/>
-            <a:ext cx="872201" cy="309893"/>
-          </a:xfrm>
-          <a:prstGeom prst="rect">
-            <a:avLst/>
-          </a:prstGeom>
-          <a:solidFill>
-            <a:schemeClr val="bg2">
-              <a:lumMod val="90000"/>
-            </a:schemeClr>
-          </a:solidFill>
-        </p:spPr>
-        <p:txBody>
-          <a:bodyPr wrap="square" lIns="0" tIns="0" rIns="0" bIns="0" rtlCol="0">
-            <a:spAutoFit/>
-          </a:bodyPr>
-          <a:lstStyle/>
-          <a:p>
-            <a:pPr algn="ctr">
-              <a:lnSpc>
-                <a:spcPts val="1200"/>
-              </a:lnSpc>
-            </a:pPr>
-            <a:r>
-              <a:rPr lang="en-GB" sz="1200" dirty="0"/>
-              <a:t>3. Data Management</a:t>
-            </a:r>
-          </a:p>
-        </p:txBody>
-      </p:sp>
-      <p:sp>
-        <p:nvSpPr>
-          <p:cNvPr id="57" name="TextBox 56">
-            <a:extLst>
-              <a:ext uri="{FF2B5EF4-FFF2-40B4-BE49-F238E27FC236}">
-                <a16:creationId xmlns:a16="http://schemas.microsoft.com/office/drawing/2014/main" id="{67E32EA5-6EF8-644D-41F9-6FEF327E5F2C}"/>
-              </a:ext>
-            </a:extLst>
-          </p:cNvPr>
-          <p:cNvSpPr txBox="1"/>
-          <p:nvPr/>
-        </p:nvSpPr>
-        <p:spPr>
-          <a:xfrm>
-            <a:off x="4820838" y="2115058"/>
-            <a:ext cx="857934" cy="156005"/>
-          </a:xfrm>
-          <a:prstGeom prst="rect">
-            <a:avLst/>
-          </a:prstGeom>
-          <a:solidFill>
-            <a:schemeClr val="bg2">
-              <a:lumMod val="90000"/>
-            </a:schemeClr>
-          </a:solidFill>
-        </p:spPr>
-        <p:txBody>
-          <a:bodyPr wrap="square" lIns="0" tIns="0" rIns="0" bIns="0" rtlCol="0">
-            <a:spAutoFit/>
-          </a:bodyPr>
-          <a:lstStyle/>
-          <a:p>
-            <a:pPr algn="ctr">
-              <a:lnSpc>
-                <a:spcPts val="1200"/>
-              </a:lnSpc>
-            </a:pPr>
-            <a:r>
-              <a:rPr lang="en-GB" sz="1200" dirty="0"/>
-              <a:t>4. Model EB</a:t>
-            </a:r>
-          </a:p>
-        </p:txBody>
-      </p:sp>
-      <p:sp>
-        <p:nvSpPr>
-          <p:cNvPr id="58" name="TextBox 57">
-            <a:extLst>
-              <a:ext uri="{FF2B5EF4-FFF2-40B4-BE49-F238E27FC236}">
-                <a16:creationId xmlns:a16="http://schemas.microsoft.com/office/drawing/2014/main" id="{276C5D89-067B-7003-467B-34075BACA9C6}"/>
-              </a:ext>
-            </a:extLst>
-          </p:cNvPr>
-          <p:cNvSpPr txBox="1"/>
-          <p:nvPr/>
-        </p:nvSpPr>
-        <p:spPr>
-          <a:xfrm>
-            <a:off x="5888317" y="2046986"/>
-            <a:ext cx="819482" cy="309893"/>
-          </a:xfrm>
-          <a:prstGeom prst="rect">
-            <a:avLst/>
-          </a:prstGeom>
-          <a:solidFill>
-            <a:schemeClr val="bg2">
-              <a:lumMod val="90000"/>
-            </a:schemeClr>
-          </a:solidFill>
-        </p:spPr>
-        <p:txBody>
-          <a:bodyPr wrap="square" lIns="0" tIns="0" rIns="0" bIns="0" rtlCol="0">
-            <a:spAutoFit/>
-          </a:bodyPr>
-          <a:lstStyle/>
-          <a:p>
-            <a:pPr algn="ctr">
-              <a:lnSpc>
-                <a:spcPts val="1200"/>
-              </a:lnSpc>
-            </a:pPr>
-            <a:r>
-              <a:rPr lang="en-GB" sz="1200" dirty="0"/>
-              <a:t>5. Model Verification</a:t>
-            </a:r>
-          </a:p>
-        </p:txBody>
-      </p:sp>
-      <p:sp>
-        <p:nvSpPr>
-          <p:cNvPr id="59" name="TextBox 58">
-            <a:extLst>
-              <a:ext uri="{FF2B5EF4-FFF2-40B4-BE49-F238E27FC236}">
-                <a16:creationId xmlns:a16="http://schemas.microsoft.com/office/drawing/2014/main" id="{8CBFD8D8-CB4D-75DA-1054-47679AAD7C6F}"/>
-              </a:ext>
-            </a:extLst>
-          </p:cNvPr>
-          <p:cNvSpPr txBox="1"/>
-          <p:nvPr/>
-        </p:nvSpPr>
-        <p:spPr>
-          <a:xfrm>
-            <a:off x="6951789" y="2036207"/>
-            <a:ext cx="857475" cy="309893"/>
-          </a:xfrm>
-          <a:prstGeom prst="rect">
-            <a:avLst/>
-          </a:prstGeom>
-          <a:solidFill>
-            <a:schemeClr val="bg2">
-              <a:lumMod val="90000"/>
-            </a:schemeClr>
-          </a:solidFill>
-        </p:spPr>
-        <p:txBody>
-          <a:bodyPr wrap="square" lIns="0" tIns="0" rIns="0" bIns="0" rtlCol="0">
-            <a:spAutoFit/>
-          </a:bodyPr>
-          <a:lstStyle/>
-          <a:p>
-            <a:pPr algn="ctr">
-              <a:lnSpc>
-                <a:spcPts val="1200"/>
-              </a:lnSpc>
-            </a:pPr>
-            <a:r>
-              <a:rPr lang="en-GB" sz="1200" dirty="0"/>
-              <a:t>6. Model Deployment</a:t>
-            </a:r>
-          </a:p>
-        </p:txBody>
-      </p:sp>
-      <p:cxnSp>
-        <p:nvCxnSpPr>
-          <p:cNvPr id="60" name="Straight Connector 59">
-            <a:extLst>
-              <a:ext uri="{FF2B5EF4-FFF2-40B4-BE49-F238E27FC236}">
-                <a16:creationId xmlns:a16="http://schemas.microsoft.com/office/drawing/2014/main" id="{8E2A1278-82BD-DEED-A416-04B9FC2060B1}"/>
-              </a:ext>
-            </a:extLst>
-          </p:cNvPr>
-          <p:cNvCxnSpPr>
-            <a:cxnSpLocks/>
-          </p:cNvCxnSpPr>
-          <p:nvPr/>
-        </p:nvCxnSpPr>
-        <p:spPr>
-          <a:xfrm flipH="1">
-            <a:off x="2451585" y="2212029"/>
-            <a:ext cx="153589" cy="0"/>
-          </a:xfrm>
-          <a:prstGeom prst="line">
-            <a:avLst/>
-          </a:prstGeom>
-          <a:ln w="19050">
-            <a:solidFill>
-              <a:schemeClr val="tx1"/>
-            </a:solidFill>
-            <a:prstDash val="solid"/>
-            <a:headEnd type="stealth" w="lg" len="lg"/>
-            <a:tailEnd type="none" w="lg" len="lg"/>
-          </a:ln>
-        </p:spPr>
-        <p:style>
-          <a:lnRef idx="1">
-            <a:schemeClr val="accent1"/>
-          </a:lnRef>
-          <a:fillRef idx="0">
-            <a:schemeClr val="accent1"/>
-          </a:fillRef>
-          <a:effectRef idx="0">
-            <a:schemeClr val="accent1"/>
-          </a:effectRef>
-          <a:fontRef idx="minor">
-            <a:schemeClr val="tx1"/>
-          </a:fontRef>
-        </p:style>
-      </p:cxnSp>
-      <p:cxnSp>
-        <p:nvCxnSpPr>
-          <p:cNvPr id="63" name="Straight Connector 62">
-            <a:extLst>
-              <a:ext uri="{FF2B5EF4-FFF2-40B4-BE49-F238E27FC236}">
-                <a16:creationId xmlns:a16="http://schemas.microsoft.com/office/drawing/2014/main" id="{83796595-E5FC-2235-E748-3B44863D9B83}"/>
-              </a:ext>
-            </a:extLst>
-          </p:cNvPr>
-          <p:cNvCxnSpPr>
-            <a:cxnSpLocks/>
-          </p:cNvCxnSpPr>
-          <p:nvPr/>
-        </p:nvCxnSpPr>
-        <p:spPr>
-          <a:xfrm flipH="1">
-            <a:off x="3531775" y="2207460"/>
-            <a:ext cx="162999" cy="0"/>
-          </a:xfrm>
-          <a:prstGeom prst="line">
-            <a:avLst/>
-          </a:prstGeom>
-          <a:ln w="19050">
-            <a:solidFill>
-              <a:schemeClr val="tx1"/>
-            </a:solidFill>
-            <a:prstDash val="solid"/>
-            <a:headEnd type="stealth" w="lg" len="lg"/>
-            <a:tailEnd type="none" w="lg" len="lg"/>
-          </a:ln>
-        </p:spPr>
-        <p:style>
-          <a:lnRef idx="1">
-            <a:schemeClr val="accent1"/>
-          </a:lnRef>
-          <a:fillRef idx="0">
-            <a:schemeClr val="accent1"/>
-          </a:fillRef>
-          <a:effectRef idx="0">
-            <a:schemeClr val="accent1"/>
-          </a:effectRef>
-          <a:fontRef idx="minor">
-            <a:schemeClr val="tx1"/>
-          </a:fontRef>
-        </p:style>
-      </p:cxnSp>
-      <p:cxnSp>
-        <p:nvCxnSpPr>
-          <p:cNvPr id="71" name="Straight Connector 70">
-            <a:extLst>
-              <a:ext uri="{FF2B5EF4-FFF2-40B4-BE49-F238E27FC236}">
-                <a16:creationId xmlns:a16="http://schemas.microsoft.com/office/drawing/2014/main" id="{7D036AC3-69E3-7FCE-1719-E1C3540F5C14}"/>
-              </a:ext>
-            </a:extLst>
-          </p:cNvPr>
-          <p:cNvCxnSpPr>
-            <a:cxnSpLocks/>
-          </p:cNvCxnSpPr>
-          <p:nvPr/>
-        </p:nvCxnSpPr>
-        <p:spPr>
-          <a:xfrm flipH="1" flipV="1">
-            <a:off x="6768181" y="2183756"/>
-            <a:ext cx="157937" cy="8630"/>
-          </a:xfrm>
-          <a:prstGeom prst="line">
-            <a:avLst/>
-          </a:prstGeom>
-          <a:ln w="19050">
-            <a:solidFill>
-              <a:schemeClr val="tx1"/>
-            </a:solidFill>
-            <a:prstDash val="solid"/>
-            <a:headEnd type="stealth" w="lg" len="lg"/>
-            <a:tailEnd type="none" w="lg" len="lg"/>
-          </a:ln>
-        </p:spPr>
-        <p:style>
-          <a:lnRef idx="1">
-            <a:schemeClr val="accent1"/>
-          </a:lnRef>
-          <a:fillRef idx="0">
-            <a:schemeClr val="accent1"/>
-          </a:fillRef>
-          <a:effectRef idx="0">
-            <a:schemeClr val="accent1"/>
-          </a:effectRef>
-          <a:fontRef idx="minor">
-            <a:schemeClr val="tx1"/>
-          </a:fontRef>
-        </p:style>
-      </p:cxnSp>
-      <p:cxnSp>
-        <p:nvCxnSpPr>
-          <p:cNvPr id="72" name="Straight Connector 71">
-            <a:extLst>
-              <a:ext uri="{FF2B5EF4-FFF2-40B4-BE49-F238E27FC236}">
-                <a16:creationId xmlns:a16="http://schemas.microsoft.com/office/drawing/2014/main" id="{4721D805-9AEC-C8F2-F8CB-BA56FB96699B}"/>
-              </a:ext>
-            </a:extLst>
-          </p:cNvPr>
-          <p:cNvCxnSpPr>
-            <a:cxnSpLocks/>
-          </p:cNvCxnSpPr>
-          <p:nvPr/>
-        </p:nvCxnSpPr>
-        <p:spPr>
-          <a:xfrm flipV="1">
-            <a:off x="3071422" y="1618362"/>
-            <a:ext cx="0" cy="270770"/>
-          </a:xfrm>
-          <a:prstGeom prst="line">
-            <a:avLst/>
-          </a:prstGeom>
-          <a:ln w="19050">
-            <a:solidFill>
-              <a:schemeClr val="tx1"/>
-            </a:solidFill>
-            <a:prstDash val="sysDot"/>
-            <a:headEnd type="stealth" w="lg" len="lg"/>
-            <a:tailEnd type="stealth" w="lg" len="lg"/>
-          </a:ln>
-        </p:spPr>
-        <p:style>
-          <a:lnRef idx="1">
-            <a:schemeClr val="accent1"/>
-          </a:lnRef>
-          <a:fillRef idx="0">
-            <a:schemeClr val="accent1"/>
-          </a:fillRef>
-          <a:effectRef idx="0">
-            <a:schemeClr val="accent1"/>
-          </a:effectRef>
-          <a:fontRef idx="minor">
-            <a:schemeClr val="tx1"/>
-          </a:fontRef>
-        </p:style>
-      </p:cxnSp>
-      <p:cxnSp>
-        <p:nvCxnSpPr>
-          <p:cNvPr id="73" name="Straight Connector 72">
-            <a:extLst>
-              <a:ext uri="{FF2B5EF4-FFF2-40B4-BE49-F238E27FC236}">
-                <a16:creationId xmlns:a16="http://schemas.microsoft.com/office/drawing/2014/main" id="{FA2A12A3-F852-68F9-B565-1B016F1B8A49}"/>
-              </a:ext>
-            </a:extLst>
-          </p:cNvPr>
-          <p:cNvCxnSpPr>
-            <a:cxnSpLocks/>
-          </p:cNvCxnSpPr>
-          <p:nvPr/>
-        </p:nvCxnSpPr>
-        <p:spPr>
-          <a:xfrm flipV="1">
-            <a:off x="4151587" y="1617748"/>
-            <a:ext cx="0" cy="270770"/>
-          </a:xfrm>
-          <a:prstGeom prst="line">
-            <a:avLst/>
-          </a:prstGeom>
-          <a:ln w="19050">
-            <a:solidFill>
-              <a:schemeClr val="tx1"/>
-            </a:solidFill>
-            <a:prstDash val="sysDot"/>
-            <a:headEnd type="stealth" w="lg" len="lg"/>
-            <a:tailEnd type="stealth" w="lg" len="lg"/>
-          </a:ln>
-        </p:spPr>
-        <p:style>
-          <a:lnRef idx="1">
-            <a:schemeClr val="accent1"/>
-          </a:lnRef>
-          <a:fillRef idx="0">
-            <a:schemeClr val="accent1"/>
-          </a:fillRef>
-          <a:effectRef idx="0">
-            <a:schemeClr val="accent1"/>
-          </a:effectRef>
-          <a:fontRef idx="minor">
-            <a:schemeClr val="tx1"/>
-          </a:fontRef>
-        </p:style>
-      </p:cxnSp>
-      <p:cxnSp>
-        <p:nvCxnSpPr>
-          <p:cNvPr id="74" name="Straight Connector 73">
-            <a:extLst>
-              <a:ext uri="{FF2B5EF4-FFF2-40B4-BE49-F238E27FC236}">
-                <a16:creationId xmlns:a16="http://schemas.microsoft.com/office/drawing/2014/main" id="{6F8D1740-4A82-E8B7-7084-80CB989C5A2C}"/>
-              </a:ext>
-            </a:extLst>
-          </p:cNvPr>
-          <p:cNvCxnSpPr>
-            <a:cxnSpLocks/>
-          </p:cNvCxnSpPr>
-          <p:nvPr/>
-        </p:nvCxnSpPr>
-        <p:spPr>
-          <a:xfrm flipV="1">
-            <a:off x="5232383" y="1613852"/>
-            <a:ext cx="0" cy="270770"/>
-          </a:xfrm>
-          <a:prstGeom prst="line">
-            <a:avLst/>
-          </a:prstGeom>
-          <a:ln w="19050">
-            <a:solidFill>
-              <a:schemeClr val="tx1"/>
-            </a:solidFill>
-            <a:prstDash val="sysDot"/>
-            <a:headEnd type="stealth" w="lg" len="lg"/>
-            <a:tailEnd type="stealth" w="lg" len="lg"/>
-          </a:ln>
-        </p:spPr>
-        <p:style>
-          <a:lnRef idx="1">
-            <a:schemeClr val="accent1"/>
-          </a:lnRef>
-          <a:fillRef idx="0">
-            <a:schemeClr val="accent1"/>
-          </a:fillRef>
-          <a:effectRef idx="0">
-            <a:schemeClr val="accent1"/>
-          </a:effectRef>
-          <a:fontRef idx="minor">
-            <a:schemeClr val="tx1"/>
-          </a:fontRef>
-        </p:style>
-      </p:cxnSp>
-      <p:cxnSp>
-        <p:nvCxnSpPr>
-          <p:cNvPr id="75" name="Straight Connector 74">
-            <a:extLst>
-              <a:ext uri="{FF2B5EF4-FFF2-40B4-BE49-F238E27FC236}">
-                <a16:creationId xmlns:a16="http://schemas.microsoft.com/office/drawing/2014/main" id="{D7618F92-4322-EED0-5174-BD1AED96DA09}"/>
-              </a:ext>
-            </a:extLst>
-          </p:cNvPr>
-          <p:cNvCxnSpPr>
-            <a:cxnSpLocks/>
-          </p:cNvCxnSpPr>
-          <p:nvPr/>
-        </p:nvCxnSpPr>
-        <p:spPr>
-          <a:xfrm flipV="1">
-            <a:off x="6281604" y="1634094"/>
-            <a:ext cx="0" cy="270770"/>
-          </a:xfrm>
-          <a:prstGeom prst="line">
-            <a:avLst/>
-          </a:prstGeom>
-          <a:ln w="19050">
-            <a:solidFill>
-              <a:schemeClr val="tx1"/>
-            </a:solidFill>
-            <a:prstDash val="sysDot"/>
-            <a:headEnd type="stealth" w="lg" len="lg"/>
-            <a:tailEnd type="stealth" w="lg" len="lg"/>
-          </a:ln>
-        </p:spPr>
-        <p:style>
-          <a:lnRef idx="1">
-            <a:schemeClr val="accent1"/>
-          </a:lnRef>
-          <a:fillRef idx="0">
-            <a:schemeClr val="accent1"/>
-          </a:fillRef>
-          <a:effectRef idx="0">
-            <a:schemeClr val="accent1"/>
-          </a:effectRef>
-          <a:fontRef idx="minor">
-            <a:schemeClr val="tx1"/>
-          </a:fontRef>
-        </p:style>
-      </p:cxnSp>
-      <p:cxnSp>
-        <p:nvCxnSpPr>
-          <p:cNvPr id="76" name="Straight Connector 75">
-            <a:extLst>
-              <a:ext uri="{FF2B5EF4-FFF2-40B4-BE49-F238E27FC236}">
-                <a16:creationId xmlns:a16="http://schemas.microsoft.com/office/drawing/2014/main" id="{CE8BBD98-AE3B-23A0-E337-A1087E06FE33}"/>
-              </a:ext>
-            </a:extLst>
-          </p:cNvPr>
-          <p:cNvCxnSpPr>
-            <a:cxnSpLocks/>
-          </p:cNvCxnSpPr>
-          <p:nvPr/>
-        </p:nvCxnSpPr>
-        <p:spPr>
-          <a:xfrm flipV="1">
-            <a:off x="7346061" y="1630885"/>
-            <a:ext cx="0" cy="270770"/>
-          </a:xfrm>
-          <a:prstGeom prst="line">
-            <a:avLst/>
-          </a:prstGeom>
-          <a:ln w="19050">
-            <a:solidFill>
-              <a:schemeClr val="tx1"/>
-            </a:solidFill>
-            <a:prstDash val="sysDot"/>
-            <a:headEnd type="stealth" w="lg" len="lg"/>
-            <a:tailEnd type="stealth" w="lg" len="lg"/>
-          </a:ln>
-        </p:spPr>
-        <p:style>
-          <a:lnRef idx="1">
-            <a:schemeClr val="accent1"/>
-          </a:lnRef>
-          <a:fillRef idx="0">
-            <a:schemeClr val="accent1"/>
-          </a:fillRef>
-          <a:effectRef idx="0">
-            <a:schemeClr val="accent1"/>
-          </a:effectRef>
-          <a:fontRef idx="minor">
-            <a:schemeClr val="tx1"/>
-          </a:fontRef>
-        </p:style>
-      </p:cxnSp>
-      <p:cxnSp>
-        <p:nvCxnSpPr>
-          <p:cNvPr id="77" name="Straight Connector 76">
-            <a:extLst>
-              <a:ext uri="{FF2B5EF4-FFF2-40B4-BE49-F238E27FC236}">
-                <a16:creationId xmlns:a16="http://schemas.microsoft.com/office/drawing/2014/main" id="{7F636869-032B-D32D-E52A-AAE3271F1B61}"/>
-              </a:ext>
-            </a:extLst>
-          </p:cNvPr>
-          <p:cNvCxnSpPr>
-            <a:cxnSpLocks/>
-          </p:cNvCxnSpPr>
-          <p:nvPr/>
-        </p:nvCxnSpPr>
-        <p:spPr>
-          <a:xfrm flipV="1">
-            <a:off x="3073528" y="2470820"/>
-            <a:ext cx="0" cy="270770"/>
-          </a:xfrm>
-          <a:prstGeom prst="line">
-            <a:avLst/>
-          </a:prstGeom>
-          <a:ln w="19050">
-            <a:solidFill>
-              <a:schemeClr val="tx1"/>
-            </a:solidFill>
-            <a:prstDash val="sysDot"/>
-            <a:headEnd type="stealth" w="lg" len="lg"/>
-            <a:tailEnd type="stealth" w="lg" len="lg"/>
-          </a:ln>
-        </p:spPr>
-        <p:style>
-          <a:lnRef idx="1">
-            <a:schemeClr val="accent1"/>
-          </a:lnRef>
-          <a:fillRef idx="0">
-            <a:schemeClr val="accent1"/>
-          </a:fillRef>
-          <a:effectRef idx="0">
-            <a:schemeClr val="accent1"/>
-          </a:effectRef>
-          <a:fontRef idx="minor">
-            <a:schemeClr val="tx1"/>
-          </a:fontRef>
-        </p:style>
-      </p:cxnSp>
-      <p:cxnSp>
-        <p:nvCxnSpPr>
-          <p:cNvPr id="78" name="Straight Connector 77">
-            <a:extLst>
-              <a:ext uri="{FF2B5EF4-FFF2-40B4-BE49-F238E27FC236}">
-                <a16:creationId xmlns:a16="http://schemas.microsoft.com/office/drawing/2014/main" id="{9611A07D-9C32-C7FA-0F94-4D51B3ED2DFF}"/>
-              </a:ext>
-            </a:extLst>
-          </p:cNvPr>
-          <p:cNvCxnSpPr>
-            <a:cxnSpLocks/>
-          </p:cNvCxnSpPr>
-          <p:nvPr/>
-        </p:nvCxnSpPr>
-        <p:spPr>
-          <a:xfrm flipV="1">
-            <a:off x="4151236" y="2482061"/>
-            <a:ext cx="0" cy="270770"/>
-          </a:xfrm>
-          <a:prstGeom prst="line">
-            <a:avLst/>
-          </a:prstGeom>
-          <a:ln w="19050">
-            <a:solidFill>
-              <a:schemeClr val="tx1"/>
-            </a:solidFill>
-            <a:prstDash val="sysDot"/>
-            <a:headEnd type="stealth" w="lg" len="lg"/>
-            <a:tailEnd type="stealth" w="lg" len="lg"/>
-          </a:ln>
-        </p:spPr>
-        <p:style>
-          <a:lnRef idx="1">
-            <a:schemeClr val="accent1"/>
-          </a:lnRef>
-          <a:fillRef idx="0">
-            <a:schemeClr val="accent1"/>
-          </a:fillRef>
-          <a:effectRef idx="0">
-            <a:schemeClr val="accent1"/>
-          </a:effectRef>
-          <a:fontRef idx="minor">
-            <a:schemeClr val="tx1"/>
-          </a:fontRef>
-        </p:style>
-      </p:cxnSp>
-      <p:cxnSp>
-        <p:nvCxnSpPr>
-          <p:cNvPr id="79" name="Straight Connector 78">
-            <a:extLst>
-              <a:ext uri="{FF2B5EF4-FFF2-40B4-BE49-F238E27FC236}">
-                <a16:creationId xmlns:a16="http://schemas.microsoft.com/office/drawing/2014/main" id="{106B37EC-B91D-C22D-3879-FE1608085D6A}"/>
-              </a:ext>
-            </a:extLst>
-          </p:cNvPr>
-          <p:cNvCxnSpPr>
-            <a:cxnSpLocks/>
-          </p:cNvCxnSpPr>
-          <p:nvPr/>
-        </p:nvCxnSpPr>
-        <p:spPr>
-          <a:xfrm flipV="1">
-            <a:off x="5242285" y="2482847"/>
-            <a:ext cx="0" cy="270770"/>
-          </a:xfrm>
-          <a:prstGeom prst="line">
-            <a:avLst/>
-          </a:prstGeom>
-          <a:ln w="19050">
-            <a:solidFill>
-              <a:schemeClr val="tx1"/>
-            </a:solidFill>
-            <a:prstDash val="sysDot"/>
-            <a:headEnd type="stealth" w="lg" len="lg"/>
-            <a:tailEnd type="stealth" w="lg" len="lg"/>
-          </a:ln>
-        </p:spPr>
-        <p:style>
-          <a:lnRef idx="1">
-            <a:schemeClr val="accent1"/>
-          </a:lnRef>
-          <a:fillRef idx="0">
-            <a:schemeClr val="accent1"/>
-          </a:fillRef>
-          <a:effectRef idx="0">
-            <a:schemeClr val="accent1"/>
-          </a:effectRef>
-          <a:fontRef idx="minor">
-            <a:schemeClr val="tx1"/>
-          </a:fontRef>
-        </p:style>
-      </p:cxnSp>
-      <p:cxnSp>
-        <p:nvCxnSpPr>
-          <p:cNvPr id="80" name="Straight Connector 79">
-            <a:extLst>
-              <a:ext uri="{FF2B5EF4-FFF2-40B4-BE49-F238E27FC236}">
-                <a16:creationId xmlns:a16="http://schemas.microsoft.com/office/drawing/2014/main" id="{2F895141-1C8D-9509-839B-3FD6FD8B549B}"/>
-              </a:ext>
-            </a:extLst>
-          </p:cNvPr>
-          <p:cNvCxnSpPr>
-            <a:cxnSpLocks/>
-          </p:cNvCxnSpPr>
-          <p:nvPr/>
-        </p:nvCxnSpPr>
-        <p:spPr>
-          <a:xfrm flipV="1">
-            <a:off x="6300132" y="2470820"/>
-            <a:ext cx="0" cy="270770"/>
-          </a:xfrm>
-          <a:prstGeom prst="line">
-            <a:avLst/>
-          </a:prstGeom>
-          <a:ln w="19050">
-            <a:solidFill>
-              <a:schemeClr val="tx1"/>
-            </a:solidFill>
-            <a:prstDash val="sysDot"/>
-            <a:headEnd type="stealth" w="lg" len="lg"/>
-            <a:tailEnd type="stealth" w="lg" len="lg"/>
-          </a:ln>
-        </p:spPr>
-        <p:style>
-          <a:lnRef idx="1">
-            <a:schemeClr val="accent1"/>
-          </a:lnRef>
-          <a:fillRef idx="0">
-            <a:schemeClr val="accent1"/>
-          </a:fillRef>
-          <a:effectRef idx="0">
-            <a:schemeClr val="accent1"/>
-          </a:effectRef>
-          <a:fontRef idx="minor">
-            <a:schemeClr val="tx1"/>
-          </a:fontRef>
-        </p:style>
-      </p:cxnSp>
-      <p:cxnSp>
-        <p:nvCxnSpPr>
-          <p:cNvPr id="81" name="Straight Connector 80">
-            <a:extLst>
-              <a:ext uri="{FF2B5EF4-FFF2-40B4-BE49-F238E27FC236}">
-                <a16:creationId xmlns:a16="http://schemas.microsoft.com/office/drawing/2014/main" id="{38596753-00A2-8599-8475-249D5E170184}"/>
-              </a:ext>
-            </a:extLst>
-          </p:cNvPr>
-          <p:cNvCxnSpPr>
-            <a:cxnSpLocks/>
-          </p:cNvCxnSpPr>
-          <p:nvPr/>
-        </p:nvCxnSpPr>
-        <p:spPr>
-          <a:xfrm flipV="1">
-            <a:off x="7346035" y="2477060"/>
-            <a:ext cx="0" cy="270770"/>
-          </a:xfrm>
-          <a:prstGeom prst="line">
-            <a:avLst/>
-          </a:prstGeom>
-          <a:ln w="19050">
-            <a:solidFill>
-              <a:schemeClr val="tx1"/>
-            </a:solidFill>
-            <a:prstDash val="sysDot"/>
-            <a:headEnd type="stealth" w="lg" len="lg"/>
-            <a:tailEnd type="stealth" w="lg" len="lg"/>
-          </a:ln>
-        </p:spPr>
-        <p:style>
-          <a:lnRef idx="1">
-            <a:schemeClr val="accent1"/>
-          </a:lnRef>
-          <a:fillRef idx="0">
-            <a:schemeClr val="accent1"/>
-          </a:fillRef>
-          <a:effectRef idx="0">
-            <a:schemeClr val="accent1"/>
-          </a:effectRef>
-          <a:fontRef idx="minor">
-            <a:schemeClr val="tx1"/>
-          </a:fontRef>
-        </p:style>
-      </p:cxnSp>
-      <p:sp>
-        <p:nvSpPr>
-          <p:cNvPr id="93" name="Folded Corner 10">
-            <a:extLst>
-              <a:ext uri="{FF2B5EF4-FFF2-40B4-BE49-F238E27FC236}">
-                <a16:creationId xmlns:a16="http://schemas.microsoft.com/office/drawing/2014/main" id="{987AB72A-6933-EF8B-990E-704B5FF325C4}"/>
-              </a:ext>
-            </a:extLst>
-          </p:cNvPr>
-          <p:cNvSpPr/>
-          <p:nvPr/>
-        </p:nvSpPr>
-        <p:spPr>
-          <a:xfrm rot="16200000">
-            <a:off x="8176809" y="1708277"/>
-            <a:ext cx="562845" cy="925196"/>
-          </a:xfrm>
-          <a:prstGeom prst="foldedCorner">
-            <a:avLst>
-              <a:gd name="adj" fmla="val 32707"/>
-            </a:avLst>
-          </a:prstGeom>
-          <a:noFill/>
-          <a:ln w="19050">
-            <a:solidFill>
-              <a:schemeClr val="tx1"/>
-            </a:solidFill>
-          </a:ln>
-        </p:spPr>
-        <p:style>
-          <a:lnRef idx="2">
-            <a:schemeClr val="accent1">
-              <a:shade val="50000"/>
-            </a:schemeClr>
-          </a:lnRef>
-          <a:fillRef idx="1">
-            <a:schemeClr val="accent1"/>
-          </a:fillRef>
-          <a:effectRef idx="0">
-            <a:schemeClr val="accent1"/>
-          </a:effectRef>
-          <a:fontRef idx="minor">
-            <a:schemeClr val="lt1"/>
-          </a:fontRef>
-        </p:style>
-        <p:txBody>
-          <a:bodyPr rot="0" spcFirstLastPara="0" vertOverflow="overflow" horzOverflow="overflow" vert="horz" wrap="square" lIns="68580" tIns="34291" rIns="68580" bIns="34291" numCol="1" spcCol="0" rtlCol="0" fromWordArt="0" anchor="ctr" anchorCtr="0" forceAA="0" compatLnSpc="1">
-            <a:prstTxWarp prst="textNoShape">
-              <a:avLst/>
-            </a:prstTxWarp>
-            <a:noAutofit/>
-          </a:bodyPr>
-          <a:lstStyle/>
-          <a:p>
-            <a:pPr algn="ctr"/>
             <a:endParaRPr lang="en-GB" sz="1000" dirty="0">
               <a:solidFill>
                 <a:schemeClr val="tx1"/>
@@ -23899,7 +23101,7 @@
         </p:nvCxnSpPr>
         <p:spPr>
           <a:xfrm flipH="1">
-            <a:off x="7843098" y="2192386"/>
+            <a:off x="7843098" y="2152626"/>
             <a:ext cx="153589" cy="0"/>
           </a:xfrm>
           <a:prstGeom prst="line">
@@ -23945,7 +23147,7 @@
         </p:nvCxnSpPr>
         <p:spPr>
           <a:xfrm flipH="1">
-            <a:off x="1382067" y="2226543"/>
+            <a:off x="1382067" y="2169743"/>
             <a:ext cx="153589" cy="0"/>
           </a:xfrm>
           <a:prstGeom prst="line">
@@ -23991,7 +23193,7 @@
         </p:nvCxnSpPr>
         <p:spPr>
           <a:xfrm>
-            <a:off x="836762" y="2874604"/>
+            <a:off x="836762" y="2745781"/>
             <a:ext cx="682966" cy="0"/>
           </a:xfrm>
           <a:prstGeom prst="line">
@@ -24035,7 +23237,7 @@
         </p:nvCxnSpPr>
         <p:spPr>
           <a:xfrm>
-            <a:off x="836762" y="1501198"/>
+            <a:off x="836762" y="1534754"/>
             <a:ext cx="682966" cy="0"/>
           </a:xfrm>
           <a:prstGeom prst="line">
@@ -24080,8 +23282,8 @@
         </p:nvCxnSpPr>
         <p:spPr>
           <a:xfrm>
-            <a:off x="842274" y="1504517"/>
-            <a:ext cx="0" cy="403784"/>
+            <a:off x="842274" y="1534754"/>
+            <a:ext cx="0" cy="373547"/>
           </a:xfrm>
           <a:prstGeom prst="line">
             <a:avLst/>
@@ -24124,8 +23326,8 @@
         </p:nvCxnSpPr>
         <p:spPr>
           <a:xfrm>
-            <a:off x="7781185" y="1501198"/>
-            <a:ext cx="631085" cy="0"/>
+            <a:off x="7791132" y="1534754"/>
+            <a:ext cx="636014" cy="0"/>
           </a:xfrm>
           <a:prstGeom prst="line">
             <a:avLst/>
@@ -24168,8 +23370,8 @@
         </p:nvCxnSpPr>
         <p:spPr>
           <a:xfrm>
-            <a:off x="8458232" y="2456847"/>
-            <a:ext cx="0" cy="416506"/>
+            <a:off x="8452552" y="2388038"/>
+            <a:ext cx="0" cy="346652"/>
           </a:xfrm>
           <a:prstGeom prst="line">
             <a:avLst/>
@@ -24212,8 +23414,8 @@
         </p:nvCxnSpPr>
         <p:spPr>
           <a:xfrm flipV="1">
-            <a:off x="842713" y="2478891"/>
-            <a:ext cx="0" cy="389913"/>
+            <a:off x="842713" y="2390840"/>
+            <a:ext cx="0" cy="356126"/>
           </a:xfrm>
           <a:prstGeom prst="line">
             <a:avLst/>
@@ -24257,8 +23459,8 @@
         </p:nvCxnSpPr>
         <p:spPr>
           <a:xfrm>
-            <a:off x="8429813" y="1499539"/>
-            <a:ext cx="3013" cy="389914"/>
+            <a:off x="8427146" y="1534754"/>
+            <a:ext cx="0" cy="354699"/>
           </a:xfrm>
           <a:prstGeom prst="line">
             <a:avLst/>
@@ -24302,7 +23504,7 @@
         </p:nvCxnSpPr>
         <p:spPr>
           <a:xfrm flipH="1">
-            <a:off x="7799758" y="2868804"/>
+            <a:off x="7791132" y="2729502"/>
             <a:ext cx="658474" cy="0"/>
           </a:xfrm>
           <a:prstGeom prst="line">
@@ -24347,7 +23549,7 @@
         </p:nvCxnSpPr>
         <p:spPr>
           <a:xfrm flipH="1">
-            <a:off x="4626097" y="2207460"/>
+            <a:off x="4626097" y="2150660"/>
             <a:ext cx="153589" cy="0"/>
           </a:xfrm>
           <a:prstGeom prst="line">
@@ -24392,9 +23594,9 @@
           <p:nvPr/>
         </p:nvCxnSpPr>
         <p:spPr>
-          <a:xfrm flipH="1">
-            <a:off x="5704884" y="2206060"/>
-            <a:ext cx="153589" cy="0"/>
+          <a:xfrm flipH="1" flipV="1">
+            <a:off x="5711603" y="2153260"/>
+            <a:ext cx="138099" cy="4863"/>
           </a:xfrm>
           <a:prstGeom prst="line">
             <a:avLst/>
@@ -24425,10 +23627,10 @@
       </p:cxnSp>
       <p:pic>
         <p:nvPicPr>
-          <p:cNvPr id="126" name="Picture 125">
-            <a:extLst>
-              <a:ext uri="{FF2B5EF4-FFF2-40B4-BE49-F238E27FC236}">
-                <a16:creationId xmlns:a16="http://schemas.microsoft.com/office/drawing/2014/main" id="{EB7BA1C0-16C1-0AE8-0A54-281A77BDF342}"/>
+          <p:cNvPr id="149" name="Picture 148">
+            <a:extLst>
+              <a:ext uri="{FF2B5EF4-FFF2-40B4-BE49-F238E27FC236}">
+                <a16:creationId xmlns:a16="http://schemas.microsoft.com/office/drawing/2014/main" id="{64FF2701-E688-7AE5-3B48-C66CB1CC2C83}"/>
               </a:ext>
             </a:extLst>
           </p:cNvPr>
@@ -24439,22 +23641,17 @@
         </p:nvPicPr>
         <p:blipFill rotWithShape="1">
           <a:blip r:embed="rId2"/>
-          <a:srcRect l="434" t="6108" r="442" b="3868"/>
+          <a:srcRect t="1291" r="223" b="1416"/>
           <a:stretch/>
         </p:blipFill>
         <p:spPr>
           <a:xfrm>
-            <a:off x="445724" y="-2780085"/>
-            <a:ext cx="12084943" cy="2336261"/>
+            <a:off x="0" y="3576411"/>
+            <a:ext cx="12164731" cy="1994642"/>
           </a:xfrm>
           <a:prstGeom prst="rect">
             <a:avLst/>
           </a:prstGeom>
-          <a:ln>
-            <a:solidFill>
-              <a:schemeClr val="bg1"/>
-            </a:solidFill>
-          </a:ln>
         </p:spPr>
       </p:pic>
     </p:spTree>

</xml_diff>